<commit_message>
Partially checked working for selector column
</commit_message>
<xml_diff>
--- a/developer/doc/Design/OSAppDesign.pptx
+++ b/developer/doc/Design/OSAppDesign.pptx
@@ -265,7 +265,7 @@
           <a:p>
             <a:fld id="{AA72EA5B-DC6A-45F6-A589-27FE2E92BF4A}" type="datetimeFigureOut">
               <a:rPr lang="en-US" smtClean="0"/>
-              <a:t>3/22/2021</a:t>
+              <a:t>3/23/2021</a:t>
             </a:fld>
             <a:endParaRPr lang="en-US"/>
           </a:p>
@@ -463,7 +463,7 @@
           <a:p>
             <a:fld id="{AA72EA5B-DC6A-45F6-A589-27FE2E92BF4A}" type="datetimeFigureOut">
               <a:rPr lang="en-US" smtClean="0"/>
-              <a:t>3/22/2021</a:t>
+              <a:t>3/23/2021</a:t>
             </a:fld>
             <a:endParaRPr lang="en-US"/>
           </a:p>
@@ -671,7 +671,7 @@
           <a:p>
             <a:fld id="{AA72EA5B-DC6A-45F6-A589-27FE2E92BF4A}" type="datetimeFigureOut">
               <a:rPr lang="en-US" smtClean="0"/>
-              <a:t>3/22/2021</a:t>
+              <a:t>3/23/2021</a:t>
             </a:fld>
             <a:endParaRPr lang="en-US"/>
           </a:p>
@@ -869,7 +869,7 @@
           <a:p>
             <a:fld id="{AA72EA5B-DC6A-45F6-A589-27FE2E92BF4A}" type="datetimeFigureOut">
               <a:rPr lang="en-US" smtClean="0"/>
-              <a:t>3/22/2021</a:t>
+              <a:t>3/23/2021</a:t>
             </a:fld>
             <a:endParaRPr lang="en-US"/>
           </a:p>
@@ -1144,7 +1144,7 @@
           <a:p>
             <a:fld id="{AA72EA5B-DC6A-45F6-A589-27FE2E92BF4A}" type="datetimeFigureOut">
               <a:rPr lang="en-US" smtClean="0"/>
-              <a:t>3/22/2021</a:t>
+              <a:t>3/23/2021</a:t>
             </a:fld>
             <a:endParaRPr lang="en-US"/>
           </a:p>
@@ -1409,7 +1409,7 @@
           <a:p>
             <a:fld id="{AA72EA5B-DC6A-45F6-A589-27FE2E92BF4A}" type="datetimeFigureOut">
               <a:rPr lang="en-US" smtClean="0"/>
-              <a:t>3/22/2021</a:t>
+              <a:t>3/23/2021</a:t>
             </a:fld>
             <a:endParaRPr lang="en-US"/>
           </a:p>
@@ -1821,7 +1821,7 @@
           <a:p>
             <a:fld id="{AA72EA5B-DC6A-45F6-A589-27FE2E92BF4A}" type="datetimeFigureOut">
               <a:rPr lang="en-US" smtClean="0"/>
-              <a:t>3/22/2021</a:t>
+              <a:t>3/23/2021</a:t>
             </a:fld>
             <a:endParaRPr lang="en-US"/>
           </a:p>
@@ -1962,7 +1962,7 @@
           <a:p>
             <a:fld id="{AA72EA5B-DC6A-45F6-A589-27FE2E92BF4A}" type="datetimeFigureOut">
               <a:rPr lang="en-US" smtClean="0"/>
-              <a:t>3/22/2021</a:t>
+              <a:t>3/23/2021</a:t>
             </a:fld>
             <a:endParaRPr lang="en-US"/>
           </a:p>
@@ -2075,7 +2075,7 @@
           <a:p>
             <a:fld id="{AA72EA5B-DC6A-45F6-A589-27FE2E92BF4A}" type="datetimeFigureOut">
               <a:rPr lang="en-US" smtClean="0"/>
-              <a:t>3/22/2021</a:t>
+              <a:t>3/23/2021</a:t>
             </a:fld>
             <a:endParaRPr lang="en-US"/>
           </a:p>
@@ -2386,7 +2386,7 @@
           <a:p>
             <a:fld id="{AA72EA5B-DC6A-45F6-A589-27FE2E92BF4A}" type="datetimeFigureOut">
               <a:rPr lang="en-US" smtClean="0"/>
-              <a:t>3/22/2021</a:t>
+              <a:t>3/23/2021</a:t>
             </a:fld>
             <a:endParaRPr lang="en-US"/>
           </a:p>
@@ -2674,7 +2674,7 @@
           <a:p>
             <a:fld id="{AA72EA5B-DC6A-45F6-A589-27FE2E92BF4A}" type="datetimeFigureOut">
               <a:rPr lang="en-US" smtClean="0"/>
-              <a:t>3/22/2021</a:t>
+              <a:t>3/23/2021</a:t>
             </a:fld>
             <a:endParaRPr lang="en-US"/>
           </a:p>
@@ -2915,7 +2915,7 @@
           <a:p>
             <a:fld id="{AA72EA5B-DC6A-45F6-A589-27FE2E92BF4A}" type="datetimeFigureOut">
               <a:rPr lang="en-US" smtClean="0"/>
-              <a:t>3/22/2021</a:t>
+              <a:t>3/23/2021</a:t>
             </a:fld>
             <a:endParaRPr lang="en-US"/>
           </a:p>
@@ -9499,7 +9499,7 @@
         </p:nvSpPr>
         <p:spPr>
           <a:xfrm>
-            <a:off x="10314804" y="3698236"/>
+            <a:off x="10494041" y="5697857"/>
             <a:ext cx="1647835" cy="850771"/>
           </a:xfrm>
           <a:prstGeom prst="rect">
@@ -9556,7 +9556,7 @@
         </p:nvSpPr>
         <p:spPr>
           <a:xfrm>
-            <a:off x="3957384" y="2352910"/>
+            <a:off x="669712" y="4151310"/>
             <a:ext cx="1647835" cy="850771"/>
           </a:xfrm>
           <a:prstGeom prst="rect">
@@ -9606,8 +9606,8 @@
         </p:nvSpPr>
         <p:spPr>
           <a:xfrm>
-            <a:off x="9960236" y="1510290"/>
-            <a:ext cx="1647835" cy="850771"/>
+            <a:off x="9955590" y="789575"/>
+            <a:ext cx="1647835" cy="1202742"/>
           </a:xfrm>
           <a:prstGeom prst="rect">
             <a:avLst/>
@@ -9645,6 +9645,14 @@
               <a:rPr lang="en-US" dirty="0" err="1"/>
               <a:t>CheckBox</a:t>
             </a:r>
+            <a:r>
+              <a:rPr lang="en-US" dirty="0"/>
+              <a:t>  concrete </a:t>
+            </a:r>
+            <a:r>
+              <a:rPr lang="en-US" dirty="0" err="1"/>
+              <a:t>GridView</a:t>
+            </a:r>
             <a:endParaRPr lang="en-US" dirty="0"/>
           </a:p>
         </p:txBody>
@@ -9663,8 +9671,8 @@
         </p:nvSpPr>
         <p:spPr>
           <a:xfrm>
-            <a:off x="6962581" y="1510291"/>
-            <a:ext cx="1647835" cy="850771"/>
+            <a:off x="6982042" y="789574"/>
+            <a:ext cx="1647835" cy="1202742"/>
           </a:xfrm>
           <a:prstGeom prst="rect">
             <a:avLst/>
@@ -9697,64 +9705,19 @@
             </a:r>
             <a:r>
               <a:rPr lang="en-US" dirty="0"/>
-              <a:t> Controller</a:t>
-            </a:r>
-          </a:p>
-        </p:txBody>
-      </p:sp>
-      <p:sp>
-        <p:nvSpPr>
-          <p:cNvPr id="44" name="Rectangle 43">
-            <a:extLst>
-              <a:ext uri="{FF2B5EF4-FFF2-40B4-BE49-F238E27FC236}">
-                <a16:creationId xmlns:a16="http://schemas.microsoft.com/office/drawing/2014/main" id="{797C902C-6AB2-491A-9B02-F7FC4DDADAD0}"/>
-              </a:ext>
-            </a:extLst>
-          </p:cNvPr>
-          <p:cNvSpPr/>
-          <p:nvPr/>
-        </p:nvSpPr>
-        <p:spPr>
-          <a:xfrm>
-            <a:off x="6958810" y="2733147"/>
-            <a:ext cx="1647835" cy="850771"/>
-          </a:xfrm>
-          <a:prstGeom prst="rect">
-            <a:avLst/>
-          </a:prstGeom>
-        </p:spPr>
-        <p:style>
-          <a:lnRef idx="2">
-            <a:schemeClr val="accent1">
-              <a:shade val="50000"/>
-            </a:schemeClr>
-          </a:lnRef>
-          <a:fillRef idx="1">
-            <a:schemeClr val="accent1"/>
-          </a:fillRef>
-          <a:effectRef idx="0">
-            <a:schemeClr val="accent1"/>
-          </a:effectRef>
-          <a:fontRef idx="minor">
-            <a:schemeClr val="lt1"/>
-          </a:fontRef>
-        </p:style>
-        <p:txBody>
-          <a:bodyPr rtlCol="0" anchor="ctr"/>
-          <a:lstStyle/>
-          <a:p>
-            <a:pPr algn="ctr"/>
+              <a:t> Controller </a:t>
+            </a:r>
             <a:r>
               <a:rPr lang="en-US" dirty="0" err="1"/>
               <a:t>onSelectAll</a:t>
             </a:r>
-            <a:endParaRPr lang="en-US" dirty="0"/>
-          </a:p>
-          <a:p>
-            <a:pPr algn="ctr"/>
+            <a:r>
+              <a:rPr lang="en-US" dirty="0"/>
+              <a:t> </a:t>
+            </a:r>
             <a:r>
               <a:rPr lang="en-US" dirty="0" err="1"/>
-              <a:t>StateChanged</a:t>
+              <a:t>clearSelection</a:t>
             </a:r>
             <a:endParaRPr lang="en-US" dirty="0"/>
           </a:p>
@@ -9770,15 +9733,16 @@
             </a:extLst>
           </p:cNvPr>
           <p:cNvCxnSpPr>
+            <a:cxnSpLocks/>
             <a:stCxn id="36" idx="1"/>
             <a:endCxn id="40" idx="3"/>
           </p:cNvCxnSpPr>
           <p:nvPr/>
         </p:nvCxnSpPr>
         <p:spPr>
-          <a:xfrm flipH="1">
-            <a:off x="8610416" y="1935676"/>
-            <a:ext cx="1349820" cy="1"/>
+          <a:xfrm flipH="1" flipV="1">
+            <a:off x="8629877" y="1390945"/>
+            <a:ext cx="1325713" cy="1"/>
           </a:xfrm>
           <a:prstGeom prst="straightConnector1">
             <a:avLst/>
@@ -9814,14 +9778,14 @@
           <p:cNvCxnSpPr>
             <a:cxnSpLocks/>
             <a:stCxn id="40" idx="2"/>
-            <a:endCxn id="44" idx="0"/>
+            <a:endCxn id="45" idx="0"/>
           </p:cNvCxnSpPr>
           <p:nvPr/>
         </p:nvCxnSpPr>
         <p:spPr>
           <a:xfrm flipH="1">
-            <a:off x="7782728" y="2361062"/>
-            <a:ext cx="3771" cy="372085"/>
+            <a:off x="7037569" y="1992316"/>
+            <a:ext cx="768391" cy="780225"/>
           </a:xfrm>
           <a:prstGeom prst="straightConnector1">
             <a:avLst/>
@@ -9859,7 +9823,7 @@
         </p:nvSpPr>
         <p:spPr>
           <a:xfrm>
-            <a:off x="8748166" y="2778296"/>
+            <a:off x="8791957" y="1102663"/>
             <a:ext cx="1323675" cy="492443"/>
           </a:xfrm>
           <a:prstGeom prst="rect">
@@ -9884,43 +9848,6 @@
               <a:rPr lang="en-US" sz="1200" dirty="0"/>
               <a:t>state</a:t>
             </a:r>
-          </a:p>
-        </p:txBody>
-      </p:sp>
-      <p:sp>
-        <p:nvSpPr>
-          <p:cNvPr id="50" name="TextBox 49">
-            <a:extLst>
-              <a:ext uri="{FF2B5EF4-FFF2-40B4-BE49-F238E27FC236}">
-                <a16:creationId xmlns:a16="http://schemas.microsoft.com/office/drawing/2014/main" id="{4FF5D597-DD36-4B33-BC30-B46BEA7FFB27}"/>
-              </a:ext>
-            </a:extLst>
-          </p:cNvPr>
-          <p:cNvSpPr txBox="1"/>
-          <p:nvPr/>
-        </p:nvSpPr>
-        <p:spPr>
-          <a:xfrm>
-            <a:off x="7003123" y="475249"/>
-            <a:ext cx="1647835" cy="523220"/>
-          </a:xfrm>
-          <a:prstGeom prst="rect">
-            <a:avLst/>
-          </a:prstGeom>
-          <a:noFill/>
-        </p:spPr>
-        <p:txBody>
-          <a:bodyPr wrap="square">
-            <a:spAutoFit/>
-          </a:bodyPr>
-          <a:lstStyle/>
-          <a:p>
-            <a:pPr algn="ctr"/>
-            <a:r>
-              <a:rPr lang="en-US" sz="1400" dirty="0"/>
-              <a:t>Clears selection or selects all</a:t>
-            </a:r>
-            <a:endParaRPr lang="en-US" sz="1200" dirty="0"/>
           </a:p>
         </p:txBody>
       </p:sp>
@@ -9996,7 +9923,7 @@
         </p:nvSpPr>
         <p:spPr>
           <a:xfrm>
-            <a:off x="2457711" y="2747519"/>
+            <a:off x="992065" y="3392710"/>
             <a:ext cx="1560251" cy="523220"/>
           </a:xfrm>
           <a:prstGeom prst="rect">
@@ -10036,15 +9963,15 @@
           </p:cNvPr>
           <p:cNvCxnSpPr>
             <a:cxnSpLocks/>
-            <a:stCxn id="34" idx="1"/>
-            <a:endCxn id="61" idx="3"/>
+            <a:stCxn id="34" idx="0"/>
+            <a:endCxn id="61" idx="2"/>
           </p:cNvCxnSpPr>
           <p:nvPr/>
         </p:nvCxnSpPr>
         <p:spPr>
-          <a:xfrm flipH="1">
-            <a:off x="2317550" y="2778296"/>
-            <a:ext cx="1639834" cy="0"/>
+          <a:xfrm flipV="1">
+            <a:off x="1493630" y="3203681"/>
+            <a:ext cx="3" cy="947629"/>
           </a:xfrm>
           <a:prstGeom prst="straightConnector1">
             <a:avLst/>
@@ -10179,49 +10106,6 @@
           </a:p>
         </p:txBody>
       </p:sp>
-      <p:cxnSp>
-        <p:nvCxnSpPr>
-          <p:cNvPr id="72" name="Connector: Elbow 71">
-            <a:extLst>
-              <a:ext uri="{FF2B5EF4-FFF2-40B4-BE49-F238E27FC236}">
-                <a16:creationId xmlns:a16="http://schemas.microsoft.com/office/drawing/2014/main" id="{8C753841-45AE-49EB-A35A-AFD1E9436251}"/>
-              </a:ext>
-            </a:extLst>
-          </p:cNvPr>
-          <p:cNvCxnSpPr>
-            <a:cxnSpLocks/>
-            <a:stCxn id="74" idx="1"/>
-            <a:endCxn id="34" idx="2"/>
-          </p:cNvCxnSpPr>
-          <p:nvPr/>
-        </p:nvCxnSpPr>
-        <p:spPr>
-          <a:xfrm rot="10800000">
-            <a:off x="4781302" y="3203681"/>
-            <a:ext cx="1449874" cy="2705546"/>
-          </a:xfrm>
-          <a:prstGeom prst="bentConnector2">
-            <a:avLst/>
-          </a:prstGeom>
-          <a:ln>
-            <a:tailEnd type="triangle"/>
-          </a:ln>
-        </p:spPr>
-        <p:style>
-          <a:lnRef idx="1">
-            <a:schemeClr val="accent1"/>
-          </a:lnRef>
-          <a:fillRef idx="0">
-            <a:schemeClr val="accent1"/>
-          </a:fillRef>
-          <a:effectRef idx="0">
-            <a:schemeClr val="accent1"/>
-          </a:effectRef>
-          <a:fontRef idx="minor">
-            <a:schemeClr val="tx1"/>
-          </a:fontRef>
-        </p:style>
-      </p:cxnSp>
       <p:sp>
         <p:nvSpPr>
           <p:cNvPr id="74" name="Rectangle 73">
@@ -10236,7 +10120,7 @@
         </p:nvSpPr>
         <p:spPr>
           <a:xfrm>
-            <a:off x="6231176" y="5483841"/>
+            <a:off x="3632924" y="4151310"/>
             <a:ext cx="1647835" cy="850771"/>
           </a:xfrm>
           <a:prstGeom prst="rect">
@@ -10332,7 +10216,7 @@
         </p:nvSpPr>
         <p:spPr>
           <a:xfrm>
-            <a:off x="10263410" y="4947595"/>
+            <a:off x="8868211" y="5794773"/>
             <a:ext cx="1191310" cy="646331"/>
           </a:xfrm>
           <a:prstGeom prst="rect">
@@ -10382,8 +10266,8 @@
         </p:nvSpPr>
         <p:spPr>
           <a:xfrm>
-            <a:off x="8543981" y="5549682"/>
-            <a:ext cx="1103790" cy="719090"/>
+            <a:off x="6579379" y="5664720"/>
+            <a:ext cx="1985474" cy="914399"/>
           </a:xfrm>
           <a:prstGeom prst="rect">
             <a:avLst/>
@@ -10411,9 +10295,18 @@
           <a:p>
             <a:pPr algn="ctr"/>
             <a:r>
+              <a:rPr lang="en-US" dirty="0" err="1"/>
+              <a:t>ObjectSelector</a:t>
+            </a:r>
+            <a:r>
               <a:rPr lang="en-US" dirty="0"/>
-              <a:t>Object Selector</a:t>
-            </a:r>
+              <a:t> </a:t>
+            </a:r>
+            <a:r>
+              <a:rPr lang="en-US" dirty="0" err="1"/>
+              <a:t>setObjectSelected</a:t>
+            </a:r>
+            <a:endParaRPr lang="en-US" dirty="0"/>
           </a:p>
         </p:txBody>
       </p:sp>
@@ -10435,8 +10328,8 @@
         </p:nvCxnSpPr>
         <p:spPr>
           <a:xfrm flipH="1">
-            <a:off x="9647771" y="5270761"/>
-            <a:ext cx="615639" cy="638466"/>
+            <a:off x="8564853" y="6117939"/>
+            <a:ext cx="303358" cy="3981"/>
           </a:xfrm>
           <a:prstGeom prst="straightConnector1">
             <a:avLst/>
@@ -10474,7 +10367,7 @@
         </p:nvSpPr>
         <p:spPr>
           <a:xfrm>
-            <a:off x="4786080" y="5860310"/>
+            <a:off x="4667568" y="5856328"/>
             <a:ext cx="1560251" cy="523220"/>
           </a:xfrm>
           <a:prstGeom prst="rect">
@@ -10503,49 +10396,6 @@
           </a:p>
         </p:txBody>
       </p:sp>
-      <p:cxnSp>
-        <p:nvCxnSpPr>
-          <p:cNvPr id="92" name="Straight Arrow Connector 91">
-            <a:extLst>
-              <a:ext uri="{FF2B5EF4-FFF2-40B4-BE49-F238E27FC236}">
-                <a16:creationId xmlns:a16="http://schemas.microsoft.com/office/drawing/2014/main" id="{E261FBFF-F466-413E-9A47-2201DCA81CB9}"/>
-              </a:ext>
-            </a:extLst>
-          </p:cNvPr>
-          <p:cNvCxnSpPr>
-            <a:cxnSpLocks/>
-            <a:stCxn id="84" idx="1"/>
-            <a:endCxn id="74" idx="3"/>
-          </p:cNvCxnSpPr>
-          <p:nvPr/>
-        </p:nvCxnSpPr>
-        <p:spPr>
-          <a:xfrm flipH="1">
-            <a:off x="7879011" y="5909227"/>
-            <a:ext cx="664970" cy="0"/>
-          </a:xfrm>
-          <a:prstGeom prst="straightConnector1">
-            <a:avLst/>
-          </a:prstGeom>
-          <a:ln>
-            <a:tailEnd type="triangle"/>
-          </a:ln>
-        </p:spPr>
-        <p:style>
-          <a:lnRef idx="1">
-            <a:schemeClr val="accent1"/>
-          </a:lnRef>
-          <a:fillRef idx="0">
-            <a:schemeClr val="accent1"/>
-          </a:fillRef>
-          <a:effectRef idx="0">
-            <a:schemeClr val="accent1"/>
-          </a:effectRef>
-          <a:fontRef idx="minor">
-            <a:schemeClr val="tx1"/>
-          </a:fontRef>
-        </p:style>
-      </p:cxnSp>
       <p:sp>
         <p:nvSpPr>
           <p:cNvPr id="95" name="Rectangle 94">
@@ -10560,8 +10410,8 @@
         </p:nvSpPr>
         <p:spPr>
           <a:xfrm>
-            <a:off x="8823972" y="3989370"/>
-            <a:ext cx="1333829" cy="914400"/>
+            <a:off x="10651044" y="4797885"/>
+            <a:ext cx="1333829" cy="652792"/>
           </a:xfrm>
           <a:prstGeom prst="rect">
             <a:avLst/>
@@ -10606,26 +10456,69 @@
           </a:p>
         </p:txBody>
       </p:sp>
+      <p:sp>
+        <p:nvSpPr>
+          <p:cNvPr id="102" name="TextBox 101">
+            <a:extLst>
+              <a:ext uri="{FF2B5EF4-FFF2-40B4-BE49-F238E27FC236}">
+                <a16:creationId xmlns:a16="http://schemas.microsoft.com/office/drawing/2014/main" id="{72E141E3-96C7-4147-86B4-CF06A588B222}"/>
+              </a:ext>
+            </a:extLst>
+          </p:cNvPr>
+          <p:cNvSpPr txBox="1"/>
+          <p:nvPr/>
+        </p:nvSpPr>
+        <p:spPr>
+          <a:xfrm>
+            <a:off x="2346460" y="4331997"/>
+            <a:ext cx="1560251" cy="523220"/>
+          </a:xfrm>
+          <a:prstGeom prst="rect">
+            <a:avLst/>
+          </a:prstGeom>
+          <a:noFill/>
+        </p:spPr>
+        <p:txBody>
+          <a:bodyPr wrap="square">
+            <a:spAutoFit/>
+          </a:bodyPr>
+          <a:lstStyle/>
+          <a:p>
+            <a:r>
+              <a:rPr lang="en-US" sz="1400" dirty="0" err="1"/>
+              <a:t>gridRow</a:t>
+            </a:r>
+            <a:endParaRPr lang="en-US" sz="1400" dirty="0"/>
+          </a:p>
+          <a:p>
+            <a:r>
+              <a:rPr lang="en-US" sz="1400" dirty="0" err="1"/>
+              <a:t>SelectionChanged</a:t>
+            </a:r>
+            <a:endParaRPr lang="en-US" sz="1400" dirty="0"/>
+          </a:p>
+        </p:txBody>
+      </p:sp>
       <p:cxnSp>
         <p:nvCxnSpPr>
-          <p:cNvPr id="97" name="Straight Arrow Connector 96">
-            <a:extLst>
-              <a:ext uri="{FF2B5EF4-FFF2-40B4-BE49-F238E27FC236}">
-                <a16:creationId xmlns:a16="http://schemas.microsoft.com/office/drawing/2014/main" id="{FE3263FA-04BD-424B-AEC5-E19426F81488}"/>
+          <p:cNvPr id="35" name="Straight Arrow Connector 34">
+            <a:extLst>
+              <a:ext uri="{FF2B5EF4-FFF2-40B4-BE49-F238E27FC236}">
+                <a16:creationId xmlns:a16="http://schemas.microsoft.com/office/drawing/2014/main" id="{4256ECD6-8DE3-4A17-9486-E11356C87AFB}"/>
               </a:ext>
             </a:extLst>
           </p:cNvPr>
           <p:cNvCxnSpPr>
             <a:cxnSpLocks/>
-            <a:stCxn id="84" idx="0"/>
-            <a:endCxn id="95" idx="2"/>
+            <a:stCxn id="95" idx="2"/>
+            <a:endCxn id="43" idx="0"/>
           </p:cNvCxnSpPr>
           <p:nvPr/>
         </p:nvCxnSpPr>
         <p:spPr>
-          <a:xfrm flipV="1">
-            <a:off x="9095876" y="4903770"/>
-            <a:ext cx="395011" cy="645912"/>
+          <a:xfrm>
+            <a:off x="11317959" y="5450677"/>
+            <a:ext cx="0" cy="247180"/>
           </a:xfrm>
           <a:prstGeom prst="straightConnector1">
             <a:avLst/>
@@ -10651,67 +10544,145 @@
       </p:cxnSp>
       <p:sp>
         <p:nvSpPr>
-          <p:cNvPr id="102" name="TextBox 101">
-            <a:extLst>
-              <a:ext uri="{FF2B5EF4-FFF2-40B4-BE49-F238E27FC236}">
-                <a16:creationId xmlns:a16="http://schemas.microsoft.com/office/drawing/2014/main" id="{72E141E3-96C7-4147-86B4-CF06A588B222}"/>
-              </a:ext>
-            </a:extLst>
-          </p:cNvPr>
-          <p:cNvSpPr txBox="1"/>
+          <p:cNvPr id="45" name="Rectangle 44">
+            <a:extLst>
+              <a:ext uri="{FF2B5EF4-FFF2-40B4-BE49-F238E27FC236}">
+                <a16:creationId xmlns:a16="http://schemas.microsoft.com/office/drawing/2014/main" id="{D1030D37-4327-4AD4-8C1B-404123B20F28}"/>
+              </a:ext>
+            </a:extLst>
+          </p:cNvPr>
+          <p:cNvSpPr/>
           <p:nvPr/>
         </p:nvSpPr>
         <p:spPr>
           <a:xfrm>
-            <a:off x="7849752" y="6202472"/>
-            <a:ext cx="1560251" cy="523220"/>
+            <a:off x="6202233" y="2772541"/>
+            <a:ext cx="1670672" cy="914400"/>
           </a:xfrm>
           <a:prstGeom prst="rect">
             <a:avLst/>
           </a:prstGeom>
-          <a:noFill/>
-        </p:spPr>
-        <p:txBody>
-          <a:bodyPr wrap="square">
-            <a:spAutoFit/>
-          </a:bodyPr>
+          <a:solidFill>
+            <a:schemeClr val="accent1"/>
+          </a:solidFill>
+        </p:spPr>
+        <p:style>
+          <a:lnRef idx="2">
+            <a:schemeClr val="accent1">
+              <a:shade val="50000"/>
+            </a:schemeClr>
+          </a:lnRef>
+          <a:fillRef idx="1">
+            <a:schemeClr val="accent1"/>
+          </a:fillRef>
+          <a:effectRef idx="0">
+            <a:schemeClr val="accent1"/>
+          </a:effectRef>
+          <a:fontRef idx="minor">
+            <a:schemeClr val="lt1"/>
+          </a:fontRef>
+        </p:style>
+        <p:txBody>
+          <a:bodyPr rtlCol="0" anchor="ctr"/>
           <a:lstStyle/>
           <a:p>
-            <a:r>
-              <a:rPr lang="en-US" sz="1400" dirty="0" err="1"/>
-              <a:t>gridRow</a:t>
-            </a:r>
-            <a:endParaRPr lang="en-US" sz="1400" dirty="0"/>
-          </a:p>
-          <a:p>
-            <a:r>
-              <a:rPr lang="en-US" sz="1400" dirty="0" err="1"/>
-              <a:t>SelectionChanged</a:t>
-            </a:r>
-            <a:endParaRPr lang="en-US" sz="1400" dirty="0"/>
+            <a:pPr algn="ctr"/>
+            <a:r>
+              <a:rPr lang="en-US" dirty="0" err="1"/>
+              <a:t>ObjectSelector</a:t>
+            </a:r>
+            <a:r>
+              <a:rPr lang="en-US" dirty="0"/>
+              <a:t> </a:t>
+            </a:r>
+            <a:r>
+              <a:rPr lang="en-US" dirty="0" err="1"/>
+              <a:t>selectAll</a:t>
+            </a:r>
+            <a:endParaRPr lang="en-US" dirty="0"/>
+          </a:p>
+        </p:txBody>
+      </p:sp>
+      <p:sp>
+        <p:nvSpPr>
+          <p:cNvPr id="42" name="Rectangle 41">
+            <a:extLst>
+              <a:ext uri="{FF2B5EF4-FFF2-40B4-BE49-F238E27FC236}">
+                <a16:creationId xmlns:a16="http://schemas.microsoft.com/office/drawing/2014/main" id="{85B95D9B-2023-4DF4-8156-012C32BD0FC0}"/>
+              </a:ext>
+            </a:extLst>
+          </p:cNvPr>
+          <p:cNvSpPr/>
+          <p:nvPr/>
+        </p:nvSpPr>
+        <p:spPr>
+          <a:xfrm>
+            <a:off x="8063617" y="2772541"/>
+            <a:ext cx="1670672" cy="914400"/>
+          </a:xfrm>
+          <a:prstGeom prst="rect">
+            <a:avLst/>
+          </a:prstGeom>
+          <a:solidFill>
+            <a:schemeClr val="accent1"/>
+          </a:solidFill>
+        </p:spPr>
+        <p:style>
+          <a:lnRef idx="2">
+            <a:schemeClr val="accent1">
+              <a:shade val="50000"/>
+            </a:schemeClr>
+          </a:lnRef>
+          <a:fillRef idx="1">
+            <a:schemeClr val="accent1"/>
+          </a:fillRef>
+          <a:effectRef idx="0">
+            <a:schemeClr val="accent1"/>
+          </a:effectRef>
+          <a:fontRef idx="minor">
+            <a:schemeClr val="lt1"/>
+          </a:fontRef>
+        </p:style>
+        <p:txBody>
+          <a:bodyPr rtlCol="0" anchor="ctr"/>
+          <a:lstStyle/>
+          <a:p>
+            <a:pPr algn="ctr"/>
+            <a:r>
+              <a:rPr lang="en-US" dirty="0" err="1"/>
+              <a:t>ObjectSelector</a:t>
+            </a:r>
+            <a:r>
+              <a:rPr lang="en-US" dirty="0"/>
+              <a:t> </a:t>
+            </a:r>
+            <a:r>
+              <a:rPr lang="en-US" dirty="0" err="1"/>
+              <a:t>clearSelection</a:t>
+            </a:r>
+            <a:endParaRPr lang="en-US" dirty="0"/>
           </a:p>
         </p:txBody>
       </p:sp>
       <p:cxnSp>
         <p:nvCxnSpPr>
-          <p:cNvPr id="35" name="Straight Arrow Connector 34">
-            <a:extLst>
-              <a:ext uri="{FF2B5EF4-FFF2-40B4-BE49-F238E27FC236}">
-                <a16:creationId xmlns:a16="http://schemas.microsoft.com/office/drawing/2014/main" id="{4256ECD6-8DE3-4A17-9486-E11356C87AFB}"/>
+          <p:cNvPr id="47" name="Straight Arrow Connector 46">
+            <a:extLst>
+              <a:ext uri="{FF2B5EF4-FFF2-40B4-BE49-F238E27FC236}">
+                <a16:creationId xmlns:a16="http://schemas.microsoft.com/office/drawing/2014/main" id="{443F79E5-E165-4BDC-B93E-EEA7542E85C1}"/>
               </a:ext>
             </a:extLst>
           </p:cNvPr>
           <p:cNvCxnSpPr>
             <a:cxnSpLocks/>
-            <a:stCxn id="95" idx="3"/>
-            <a:endCxn id="43" idx="1"/>
+            <a:stCxn id="40" idx="2"/>
           </p:cNvCxnSpPr>
           <p:nvPr/>
         </p:nvCxnSpPr>
         <p:spPr>
-          <a:xfrm flipV="1">
-            <a:off x="10157801" y="4123622"/>
-            <a:ext cx="157003" cy="322948"/>
+          <a:xfrm>
+            <a:off x="7805960" y="1992316"/>
+            <a:ext cx="1178778" cy="909695"/>
           </a:xfrm>
           <a:prstGeom prst="straightConnector1">
             <a:avLst/>
@@ -10737,128 +10708,24 @@
       </p:cxnSp>
       <p:cxnSp>
         <p:nvCxnSpPr>
-          <p:cNvPr id="38" name="Straight Arrow Connector 37">
-            <a:extLst>
-              <a:ext uri="{FF2B5EF4-FFF2-40B4-BE49-F238E27FC236}">
-                <a16:creationId xmlns:a16="http://schemas.microsoft.com/office/drawing/2014/main" id="{1EA602E2-9893-4C0E-9DAC-714578C8A2CF}"/>
+          <p:cNvPr id="87" name="Straight Arrow Connector 86">
+            <a:extLst>
+              <a:ext uri="{FF2B5EF4-FFF2-40B4-BE49-F238E27FC236}">
+                <a16:creationId xmlns:a16="http://schemas.microsoft.com/office/drawing/2014/main" id="{F8C20A0D-AE37-4567-B712-BAFBE6E65518}"/>
               </a:ext>
             </a:extLst>
           </p:cNvPr>
           <p:cNvCxnSpPr>
             <a:cxnSpLocks/>
-            <a:stCxn id="43" idx="2"/>
-            <a:endCxn id="79" idx="0"/>
+            <a:stCxn id="74" idx="1"/>
+            <a:endCxn id="34" idx="3"/>
           </p:cNvCxnSpPr>
           <p:nvPr/>
         </p:nvCxnSpPr>
         <p:spPr>
           <a:xfrm flipH="1">
-            <a:off x="10859065" y="4549007"/>
-            <a:ext cx="279657" cy="398588"/>
-          </a:xfrm>
-          <a:prstGeom prst="straightConnector1">
-            <a:avLst/>
-          </a:prstGeom>
-          <a:ln>
-            <a:tailEnd type="triangle"/>
-          </a:ln>
-        </p:spPr>
-        <p:style>
-          <a:lnRef idx="1">
-            <a:schemeClr val="accent1"/>
-          </a:lnRef>
-          <a:fillRef idx="0">
-            <a:schemeClr val="accent1"/>
-          </a:fillRef>
-          <a:effectRef idx="0">
-            <a:schemeClr val="accent1"/>
-          </a:effectRef>
-          <a:fontRef idx="minor">
-            <a:schemeClr val="tx1"/>
-          </a:fontRef>
-        </p:style>
-      </p:cxnSp>
-      <p:sp>
-        <p:nvSpPr>
-          <p:cNvPr id="45" name="Rectangle 44">
-            <a:extLst>
-              <a:ext uri="{FF2B5EF4-FFF2-40B4-BE49-F238E27FC236}">
-                <a16:creationId xmlns:a16="http://schemas.microsoft.com/office/drawing/2014/main" id="{D1030D37-4327-4AD4-8C1B-404123B20F28}"/>
-              </a:ext>
-            </a:extLst>
-          </p:cNvPr>
-          <p:cNvSpPr/>
-          <p:nvPr/>
-        </p:nvSpPr>
-        <p:spPr>
-          <a:xfrm>
-            <a:off x="6935973" y="3989999"/>
-            <a:ext cx="1670672" cy="914400"/>
-          </a:xfrm>
-          <a:prstGeom prst="rect">
-            <a:avLst/>
-          </a:prstGeom>
-          <a:solidFill>
-            <a:schemeClr val="accent1"/>
-          </a:solidFill>
-        </p:spPr>
-        <p:style>
-          <a:lnRef idx="2">
-            <a:schemeClr val="accent1">
-              <a:shade val="50000"/>
-            </a:schemeClr>
-          </a:lnRef>
-          <a:fillRef idx="1">
-            <a:schemeClr val="accent1"/>
-          </a:fillRef>
-          <a:effectRef idx="0">
-            <a:schemeClr val="accent1"/>
-          </a:effectRef>
-          <a:fontRef idx="minor">
-            <a:schemeClr val="lt1"/>
-          </a:fontRef>
-        </p:style>
-        <p:txBody>
-          <a:bodyPr rtlCol="0" anchor="ctr"/>
-          <a:lstStyle/>
-          <a:p>
-            <a:pPr algn="ctr"/>
-            <a:r>
-              <a:rPr lang="en-US" dirty="0" err="1"/>
-              <a:t>selectAll</a:t>
-            </a:r>
-            <a:r>
-              <a:rPr lang="en-US" dirty="0"/>
-              <a:t> </a:t>
-            </a:r>
-            <a:r>
-              <a:rPr lang="en-US" dirty="0" err="1"/>
-              <a:t>clearSelection</a:t>
-            </a:r>
-            <a:endParaRPr lang="en-US" dirty="0"/>
-          </a:p>
-        </p:txBody>
-      </p:sp>
-      <p:cxnSp>
-        <p:nvCxnSpPr>
-          <p:cNvPr id="55" name="Straight Arrow Connector 54">
-            <a:extLst>
-              <a:ext uri="{FF2B5EF4-FFF2-40B4-BE49-F238E27FC236}">
-                <a16:creationId xmlns:a16="http://schemas.microsoft.com/office/drawing/2014/main" id="{5C381A46-EED5-4899-A5BA-1D7C36C20DCB}"/>
-              </a:ext>
-            </a:extLst>
-          </p:cNvPr>
-          <p:cNvCxnSpPr>
-            <a:cxnSpLocks/>
-            <a:stCxn id="44" idx="2"/>
-            <a:endCxn id="45" idx="0"/>
-          </p:cNvCxnSpPr>
-          <p:nvPr/>
-        </p:nvCxnSpPr>
-        <p:spPr>
-          <a:xfrm flipH="1">
-            <a:off x="7771309" y="3583918"/>
-            <a:ext cx="11419" cy="406081"/>
+            <a:off x="2317547" y="4576696"/>
+            <a:ext cx="1315377" cy="0"/>
           </a:xfrm>
           <a:prstGeom prst="straightConnector1">
             <a:avLst/>
@@ -10884,24 +10751,65 @@
       </p:cxnSp>
       <p:cxnSp>
         <p:nvCxnSpPr>
-          <p:cNvPr id="70" name="Straight Arrow Connector 69">
-            <a:extLst>
-              <a:ext uri="{FF2B5EF4-FFF2-40B4-BE49-F238E27FC236}">
-                <a16:creationId xmlns:a16="http://schemas.microsoft.com/office/drawing/2014/main" id="{38CB03BA-8272-4B89-931C-CB160962428D}"/>
+          <p:cNvPr id="107" name="Connector: Elbow 106">
+            <a:extLst>
+              <a:ext uri="{FF2B5EF4-FFF2-40B4-BE49-F238E27FC236}">
+                <a16:creationId xmlns:a16="http://schemas.microsoft.com/office/drawing/2014/main" id="{470A4A69-8CDB-4930-BD18-9CBD159FE387}"/>
               </a:ext>
             </a:extLst>
           </p:cNvPr>
           <p:cNvCxnSpPr>
             <a:cxnSpLocks/>
-            <a:stCxn id="45" idx="2"/>
-            <a:endCxn id="84" idx="0"/>
           </p:cNvCxnSpPr>
           <p:nvPr/>
         </p:nvCxnSpPr>
         <p:spPr>
-          <a:xfrm>
-            <a:off x="7771309" y="4904399"/>
-            <a:ext cx="1324567" cy="645283"/>
+          <a:xfrm rot="5400000">
+            <a:off x="6644979" y="2322722"/>
+            <a:ext cx="889755" cy="3618194"/>
+          </a:xfrm>
+          <a:prstGeom prst="bentConnector2">
+            <a:avLst/>
+          </a:prstGeom>
+          <a:ln>
+            <a:tailEnd type="triangle"/>
+          </a:ln>
+        </p:spPr>
+        <p:style>
+          <a:lnRef idx="1">
+            <a:schemeClr val="accent1"/>
+          </a:lnRef>
+          <a:fillRef idx="0">
+            <a:schemeClr val="accent1"/>
+          </a:fillRef>
+          <a:effectRef idx="0">
+            <a:schemeClr val="accent1"/>
+          </a:effectRef>
+          <a:fontRef idx="minor">
+            <a:schemeClr val="tx1"/>
+          </a:fontRef>
+        </p:style>
+      </p:cxnSp>
+      <p:cxnSp>
+        <p:nvCxnSpPr>
+          <p:cNvPr id="120" name="Straight Arrow Connector 119">
+            <a:extLst>
+              <a:ext uri="{FF2B5EF4-FFF2-40B4-BE49-F238E27FC236}">
+                <a16:creationId xmlns:a16="http://schemas.microsoft.com/office/drawing/2014/main" id="{23731FFA-6AB8-4DED-A519-1A6460A03192}"/>
+              </a:ext>
+            </a:extLst>
+          </p:cNvPr>
+          <p:cNvCxnSpPr>
+            <a:cxnSpLocks/>
+            <a:stCxn id="43" idx="1"/>
+            <a:endCxn id="79" idx="3"/>
+          </p:cNvCxnSpPr>
+          <p:nvPr/>
+        </p:nvCxnSpPr>
+        <p:spPr>
+          <a:xfrm flipH="1" flipV="1">
+            <a:off x="10059521" y="6117939"/>
+            <a:ext cx="434520" cy="5304"/>
           </a:xfrm>
           <a:prstGeom prst="straightConnector1">
             <a:avLst/>
@@ -10925,6 +10833,322 @@
           </a:fontRef>
         </p:style>
       </p:cxnSp>
+      <p:sp>
+        <p:nvSpPr>
+          <p:cNvPr id="137" name="Rectangle 136">
+            <a:extLst>
+              <a:ext uri="{FF2B5EF4-FFF2-40B4-BE49-F238E27FC236}">
+                <a16:creationId xmlns:a16="http://schemas.microsoft.com/office/drawing/2014/main" id="{7538CAE2-DE61-4C34-A986-7FB3E405CAA0}"/>
+              </a:ext>
+            </a:extLst>
+          </p:cNvPr>
+          <p:cNvSpPr/>
+          <p:nvPr/>
+        </p:nvSpPr>
+        <p:spPr>
+          <a:xfrm>
+            <a:off x="6579379" y="4706666"/>
+            <a:ext cx="1985474" cy="914399"/>
+          </a:xfrm>
+          <a:prstGeom prst="rect">
+            <a:avLst/>
+          </a:prstGeom>
+        </p:spPr>
+        <p:style>
+          <a:lnRef idx="2">
+            <a:schemeClr val="accent1">
+              <a:shade val="50000"/>
+            </a:schemeClr>
+          </a:lnRef>
+          <a:fillRef idx="1">
+            <a:schemeClr val="accent1"/>
+          </a:fillRef>
+          <a:effectRef idx="0">
+            <a:schemeClr val="accent1"/>
+          </a:effectRef>
+          <a:fontRef idx="minor">
+            <a:schemeClr val="lt1"/>
+          </a:fontRef>
+        </p:style>
+        <p:txBody>
+          <a:bodyPr rtlCol="0" anchor="ctr"/>
+          <a:lstStyle/>
+          <a:p>
+            <a:pPr algn="ctr"/>
+            <a:r>
+              <a:rPr lang="en-US" dirty="0" err="1"/>
+              <a:t>ObjectSelector</a:t>
+            </a:r>
+            <a:r>
+              <a:rPr lang="en-US" dirty="0"/>
+              <a:t> </a:t>
+            </a:r>
+            <a:r>
+              <a:rPr lang="en-US" dirty="0" err="1"/>
+              <a:t>getObjectSelected</a:t>
+            </a:r>
+            <a:endParaRPr lang="en-US" dirty="0"/>
+          </a:p>
+        </p:txBody>
+      </p:sp>
+      <p:cxnSp>
+        <p:nvCxnSpPr>
+          <p:cNvPr id="139" name="Straight Arrow Connector 138">
+            <a:extLst>
+              <a:ext uri="{FF2B5EF4-FFF2-40B4-BE49-F238E27FC236}">
+                <a16:creationId xmlns:a16="http://schemas.microsoft.com/office/drawing/2014/main" id="{BE723D83-FCE0-40E2-8D20-7DED8B928D18}"/>
+              </a:ext>
+            </a:extLst>
+          </p:cNvPr>
+          <p:cNvCxnSpPr>
+            <a:cxnSpLocks/>
+            <a:stCxn id="137" idx="3"/>
+            <a:endCxn id="95" idx="1"/>
+          </p:cNvCxnSpPr>
+          <p:nvPr/>
+        </p:nvCxnSpPr>
+        <p:spPr>
+          <a:xfrm flipV="1">
+            <a:off x="8564853" y="5124281"/>
+            <a:ext cx="2086191" cy="39585"/>
+          </a:xfrm>
+          <a:prstGeom prst="straightConnector1">
+            <a:avLst/>
+          </a:prstGeom>
+          <a:ln>
+            <a:tailEnd type="triangle"/>
+          </a:ln>
+        </p:spPr>
+        <p:style>
+          <a:lnRef idx="1">
+            <a:schemeClr val="accent1"/>
+          </a:lnRef>
+          <a:fillRef idx="0">
+            <a:schemeClr val="accent1"/>
+          </a:fillRef>
+          <a:effectRef idx="0">
+            <a:schemeClr val="accent1"/>
+          </a:effectRef>
+          <a:fontRef idx="minor">
+            <a:schemeClr val="tx1"/>
+          </a:fontRef>
+        </p:style>
+      </p:cxnSp>
+      <p:cxnSp>
+        <p:nvCxnSpPr>
+          <p:cNvPr id="146" name="Connector: Elbow 145">
+            <a:extLst>
+              <a:ext uri="{FF2B5EF4-FFF2-40B4-BE49-F238E27FC236}">
+                <a16:creationId xmlns:a16="http://schemas.microsoft.com/office/drawing/2014/main" id="{E854AA68-962C-42EC-B23E-91024977EBF9}"/>
+              </a:ext>
+            </a:extLst>
+          </p:cNvPr>
+          <p:cNvCxnSpPr>
+            <a:cxnSpLocks/>
+            <a:stCxn id="45" idx="2"/>
+            <a:endCxn id="74" idx="3"/>
+          </p:cNvCxnSpPr>
+          <p:nvPr/>
+        </p:nvCxnSpPr>
+        <p:spPr>
+          <a:xfrm rot="5400000">
+            <a:off x="5714287" y="3253413"/>
+            <a:ext cx="889755" cy="1756810"/>
+          </a:xfrm>
+          <a:prstGeom prst="bentConnector2">
+            <a:avLst/>
+          </a:prstGeom>
+          <a:ln>
+            <a:tailEnd type="triangle"/>
+          </a:ln>
+        </p:spPr>
+        <p:style>
+          <a:lnRef idx="1">
+            <a:schemeClr val="accent1"/>
+          </a:lnRef>
+          <a:fillRef idx="0">
+            <a:schemeClr val="accent1"/>
+          </a:fillRef>
+          <a:effectRef idx="0">
+            <a:schemeClr val="accent1"/>
+          </a:effectRef>
+          <a:fontRef idx="minor">
+            <a:schemeClr val="tx1"/>
+          </a:fontRef>
+        </p:style>
+      </p:cxnSp>
+      <p:sp>
+        <p:nvSpPr>
+          <p:cNvPr id="149" name="TextBox 148">
+            <a:extLst>
+              <a:ext uri="{FF2B5EF4-FFF2-40B4-BE49-F238E27FC236}">
+                <a16:creationId xmlns:a16="http://schemas.microsoft.com/office/drawing/2014/main" id="{C462D054-FA9E-4426-B8E4-4D56CC3D1EA6}"/>
+              </a:ext>
+            </a:extLst>
+          </p:cNvPr>
+          <p:cNvSpPr txBox="1"/>
+          <p:nvPr/>
+        </p:nvSpPr>
+        <p:spPr>
+          <a:xfrm>
+            <a:off x="5612533" y="4045350"/>
+            <a:ext cx="1560251" cy="523220"/>
+          </a:xfrm>
+          <a:prstGeom prst="rect">
+            <a:avLst/>
+          </a:prstGeom>
+          <a:noFill/>
+        </p:spPr>
+        <p:txBody>
+          <a:bodyPr wrap="square">
+            <a:spAutoFit/>
+          </a:bodyPr>
+          <a:lstStyle/>
+          <a:p>
+            <a:r>
+              <a:rPr lang="en-US" sz="1400" dirty="0" err="1"/>
+              <a:t>gridRow</a:t>
+            </a:r>
+            <a:endParaRPr lang="en-US" sz="1400" dirty="0"/>
+          </a:p>
+          <a:p>
+            <a:r>
+              <a:rPr lang="en-US" sz="1400" dirty="0" err="1"/>
+              <a:t>SelectionChanged</a:t>
+            </a:r>
+            <a:endParaRPr lang="en-US" sz="1400" dirty="0"/>
+          </a:p>
+        </p:txBody>
+      </p:sp>
+      <p:cxnSp>
+        <p:nvCxnSpPr>
+          <p:cNvPr id="164" name="Connector: Elbow 163">
+            <a:extLst>
+              <a:ext uri="{FF2B5EF4-FFF2-40B4-BE49-F238E27FC236}">
+                <a16:creationId xmlns:a16="http://schemas.microsoft.com/office/drawing/2014/main" id="{003B322A-9611-4B9B-B555-16A152256D3F}"/>
+              </a:ext>
+            </a:extLst>
+          </p:cNvPr>
+          <p:cNvCxnSpPr>
+            <a:stCxn id="84" idx="1"/>
+            <a:endCxn id="74" idx="2"/>
+          </p:cNvCxnSpPr>
+          <p:nvPr/>
+        </p:nvCxnSpPr>
+        <p:spPr>
+          <a:xfrm rot="10800000">
+            <a:off x="4456843" y="5002082"/>
+            <a:ext cx="2122537" cy="1119839"/>
+          </a:xfrm>
+          <a:prstGeom prst="bentConnector2">
+            <a:avLst/>
+          </a:prstGeom>
+          <a:ln>
+            <a:tailEnd type="triangle"/>
+          </a:ln>
+        </p:spPr>
+        <p:style>
+          <a:lnRef idx="1">
+            <a:schemeClr val="accent1"/>
+          </a:lnRef>
+          <a:fillRef idx="0">
+            <a:schemeClr val="accent1"/>
+          </a:fillRef>
+          <a:effectRef idx="0">
+            <a:schemeClr val="accent1"/>
+          </a:effectRef>
+          <a:fontRef idx="minor">
+            <a:schemeClr val="tx1"/>
+          </a:fontRef>
+        </p:style>
+      </p:cxnSp>
+      <p:cxnSp>
+        <p:nvCxnSpPr>
+          <p:cNvPr id="166" name="Connector: Elbow 165">
+            <a:extLst>
+              <a:ext uri="{FF2B5EF4-FFF2-40B4-BE49-F238E27FC236}">
+                <a16:creationId xmlns:a16="http://schemas.microsoft.com/office/drawing/2014/main" id="{7290D054-63C6-4A28-8CFE-D6960C1EBBD3}"/>
+              </a:ext>
+            </a:extLst>
+          </p:cNvPr>
+          <p:cNvCxnSpPr>
+            <a:stCxn id="74" idx="0"/>
+            <a:endCxn id="36" idx="0"/>
+          </p:cNvCxnSpPr>
+          <p:nvPr/>
+        </p:nvCxnSpPr>
+        <p:spPr>
+          <a:xfrm rot="5400000" flipH="1" flipV="1">
+            <a:off x="5937308" y="-690890"/>
+            <a:ext cx="3361735" cy="6322666"/>
+          </a:xfrm>
+          <a:prstGeom prst="bentConnector3">
+            <a:avLst>
+              <a:gd name="adj1" fmla="val 106800"/>
+            </a:avLst>
+          </a:prstGeom>
+          <a:ln>
+            <a:tailEnd type="triangle"/>
+          </a:ln>
+        </p:spPr>
+        <p:style>
+          <a:lnRef idx="1">
+            <a:schemeClr val="accent1"/>
+          </a:lnRef>
+          <a:fillRef idx="0">
+            <a:schemeClr val="accent1"/>
+          </a:fillRef>
+          <a:effectRef idx="0">
+            <a:schemeClr val="accent1"/>
+          </a:effectRef>
+          <a:fontRef idx="minor">
+            <a:schemeClr val="tx1"/>
+          </a:fontRef>
+        </p:style>
+      </p:cxnSp>
+      <p:sp>
+        <p:nvSpPr>
+          <p:cNvPr id="167" name="TextBox 166">
+            <a:extLst>
+              <a:ext uri="{FF2B5EF4-FFF2-40B4-BE49-F238E27FC236}">
+                <a16:creationId xmlns:a16="http://schemas.microsoft.com/office/drawing/2014/main" id="{72F33AAA-0AA8-4E0E-AE02-717BFEF0FDCB}"/>
+              </a:ext>
+            </a:extLst>
+          </p:cNvPr>
+          <p:cNvSpPr txBox="1"/>
+          <p:nvPr/>
+        </p:nvSpPr>
+        <p:spPr>
+          <a:xfrm>
+            <a:off x="4737985" y="238584"/>
+            <a:ext cx="1560251" cy="523220"/>
+          </a:xfrm>
+          <a:prstGeom prst="rect">
+            <a:avLst/>
+          </a:prstGeom>
+          <a:noFill/>
+        </p:spPr>
+        <p:txBody>
+          <a:bodyPr wrap="square">
+            <a:spAutoFit/>
+          </a:bodyPr>
+          <a:lstStyle/>
+          <a:p>
+            <a:r>
+              <a:rPr lang="en-US" sz="1400" dirty="0" err="1"/>
+              <a:t>gridRow</a:t>
+            </a:r>
+            <a:endParaRPr lang="en-US" sz="1400" dirty="0"/>
+          </a:p>
+          <a:p>
+            <a:r>
+              <a:rPr lang="en-US" sz="1400" dirty="0" err="1"/>
+              <a:t>SelectionChanged</a:t>
+            </a:r>
+            <a:endParaRPr lang="en-US" sz="1400" dirty="0"/>
+          </a:p>
+        </p:txBody>
+      </p:sp>
     </p:spTree>
     <p:extLst>
       <p:ext uri="{BB962C8B-B14F-4D97-AF65-F5344CB8AC3E}">

</xml_diff>

<commit_message>
Snapshot before moving Wrapper and Holder
</commit_message>
<xml_diff>
--- a/developer/doc/Design/OSAppDesign.pptx
+++ b/developer/doc/Design/OSAppDesign.pptx
@@ -7,11 +7,12 @@
   <p:sldIdLst>
     <p:sldId id="262" r:id="rId2"/>
     <p:sldId id="256" r:id="rId3"/>
-    <p:sldId id="263" r:id="rId4"/>
-    <p:sldId id="259" r:id="rId5"/>
-    <p:sldId id="258" r:id="rId6"/>
-    <p:sldId id="260" r:id="rId7"/>
-    <p:sldId id="261" r:id="rId8"/>
+    <p:sldId id="264" r:id="rId4"/>
+    <p:sldId id="263" r:id="rId5"/>
+    <p:sldId id="259" r:id="rId6"/>
+    <p:sldId id="258" r:id="rId7"/>
+    <p:sldId id="260" r:id="rId8"/>
+    <p:sldId id="261" r:id="rId9"/>
   </p:sldIdLst>
   <p:sldSz cx="12192000" cy="6858000"/>
   <p:notesSz cx="6858000" cy="9144000"/>
@@ -265,7 +266,7 @@
           <a:p>
             <a:fld id="{AA72EA5B-DC6A-45F6-A589-27FE2E92BF4A}" type="datetimeFigureOut">
               <a:rPr lang="en-US" smtClean="0"/>
-              <a:t>3/23/2021</a:t>
+              <a:t>3/28/2021</a:t>
             </a:fld>
             <a:endParaRPr lang="en-US"/>
           </a:p>
@@ -463,7 +464,7 @@
           <a:p>
             <a:fld id="{AA72EA5B-DC6A-45F6-A589-27FE2E92BF4A}" type="datetimeFigureOut">
               <a:rPr lang="en-US" smtClean="0"/>
-              <a:t>3/23/2021</a:t>
+              <a:t>3/28/2021</a:t>
             </a:fld>
             <a:endParaRPr lang="en-US"/>
           </a:p>
@@ -671,7 +672,7 @@
           <a:p>
             <a:fld id="{AA72EA5B-DC6A-45F6-A589-27FE2E92BF4A}" type="datetimeFigureOut">
               <a:rPr lang="en-US" smtClean="0"/>
-              <a:t>3/23/2021</a:t>
+              <a:t>3/28/2021</a:t>
             </a:fld>
             <a:endParaRPr lang="en-US"/>
           </a:p>
@@ -869,7 +870,7 @@
           <a:p>
             <a:fld id="{AA72EA5B-DC6A-45F6-A589-27FE2E92BF4A}" type="datetimeFigureOut">
               <a:rPr lang="en-US" smtClean="0"/>
-              <a:t>3/23/2021</a:t>
+              <a:t>3/28/2021</a:t>
             </a:fld>
             <a:endParaRPr lang="en-US"/>
           </a:p>
@@ -1144,7 +1145,7 @@
           <a:p>
             <a:fld id="{AA72EA5B-DC6A-45F6-A589-27FE2E92BF4A}" type="datetimeFigureOut">
               <a:rPr lang="en-US" smtClean="0"/>
-              <a:t>3/23/2021</a:t>
+              <a:t>3/28/2021</a:t>
             </a:fld>
             <a:endParaRPr lang="en-US"/>
           </a:p>
@@ -1409,7 +1410,7 @@
           <a:p>
             <a:fld id="{AA72EA5B-DC6A-45F6-A589-27FE2E92BF4A}" type="datetimeFigureOut">
               <a:rPr lang="en-US" smtClean="0"/>
-              <a:t>3/23/2021</a:t>
+              <a:t>3/28/2021</a:t>
             </a:fld>
             <a:endParaRPr lang="en-US"/>
           </a:p>
@@ -1821,7 +1822,7 @@
           <a:p>
             <a:fld id="{AA72EA5B-DC6A-45F6-A589-27FE2E92BF4A}" type="datetimeFigureOut">
               <a:rPr lang="en-US" smtClean="0"/>
-              <a:t>3/23/2021</a:t>
+              <a:t>3/28/2021</a:t>
             </a:fld>
             <a:endParaRPr lang="en-US"/>
           </a:p>
@@ -1962,7 +1963,7 @@
           <a:p>
             <a:fld id="{AA72EA5B-DC6A-45F6-A589-27FE2E92BF4A}" type="datetimeFigureOut">
               <a:rPr lang="en-US" smtClean="0"/>
-              <a:t>3/23/2021</a:t>
+              <a:t>3/28/2021</a:t>
             </a:fld>
             <a:endParaRPr lang="en-US"/>
           </a:p>
@@ -2075,7 +2076,7 @@
           <a:p>
             <a:fld id="{AA72EA5B-DC6A-45F6-A589-27FE2E92BF4A}" type="datetimeFigureOut">
               <a:rPr lang="en-US" smtClean="0"/>
-              <a:t>3/23/2021</a:t>
+              <a:t>3/28/2021</a:t>
             </a:fld>
             <a:endParaRPr lang="en-US"/>
           </a:p>
@@ -2386,7 +2387,7 @@
           <a:p>
             <a:fld id="{AA72EA5B-DC6A-45F6-A589-27FE2E92BF4A}" type="datetimeFigureOut">
               <a:rPr lang="en-US" smtClean="0"/>
-              <a:t>3/23/2021</a:t>
+              <a:t>3/28/2021</a:t>
             </a:fld>
             <a:endParaRPr lang="en-US"/>
           </a:p>
@@ -2674,7 +2675,7 @@
           <a:p>
             <a:fld id="{AA72EA5B-DC6A-45F6-A589-27FE2E92BF4A}" type="datetimeFigureOut">
               <a:rPr lang="en-US" smtClean="0"/>
-              <a:t>3/23/2021</a:t>
+              <a:t>3/28/2021</a:t>
             </a:fld>
             <a:endParaRPr lang="en-US"/>
           </a:p>
@@ -2915,7 +2916,7 @@
           <a:p>
             <a:fld id="{AA72EA5B-DC6A-45F6-A589-27FE2E92BF4A}" type="datetimeFigureOut">
               <a:rPr lang="en-US" smtClean="0"/>
-              <a:t>3/23/2021</a:t>
+              <a:t>3/28/2021</a:t>
             </a:fld>
             <a:endParaRPr lang="en-US"/>
           </a:p>
@@ -3418,6 +3419,823 @@
       </p:grpSpPr>
       <p:sp>
         <p:nvSpPr>
+          <p:cNvPr id="2" name="Rectangle 1">
+            <a:extLst>
+              <a:ext uri="{FF2B5EF4-FFF2-40B4-BE49-F238E27FC236}">
+                <a16:creationId xmlns:a16="http://schemas.microsoft.com/office/drawing/2014/main" id="{ECD0FB6D-7C27-4E3C-8BFA-73473813936D}"/>
+              </a:ext>
+            </a:extLst>
+          </p:cNvPr>
+          <p:cNvSpPr/>
+          <p:nvPr/>
+        </p:nvSpPr>
+        <p:spPr>
+          <a:xfrm>
+            <a:off x="6899563" y="803565"/>
+            <a:ext cx="3671455" cy="4959928"/>
+          </a:xfrm>
+          <a:prstGeom prst="rect">
+            <a:avLst/>
+          </a:prstGeom>
+          <a:solidFill>
+            <a:schemeClr val="bg1"/>
+          </a:solidFill>
+        </p:spPr>
+        <p:style>
+          <a:lnRef idx="2">
+            <a:schemeClr val="accent1">
+              <a:shade val="50000"/>
+            </a:schemeClr>
+          </a:lnRef>
+          <a:fillRef idx="1">
+            <a:schemeClr val="accent1"/>
+          </a:fillRef>
+          <a:effectRef idx="0">
+            <a:schemeClr val="accent1"/>
+          </a:effectRef>
+          <a:fontRef idx="minor">
+            <a:schemeClr val="lt1"/>
+          </a:fontRef>
+        </p:style>
+        <p:txBody>
+          <a:bodyPr rtlCol="0" anchor="ctr"/>
+          <a:lstStyle/>
+          <a:p>
+            <a:pPr algn="ctr"/>
+            <a:endParaRPr lang="en-US"/>
+          </a:p>
+        </p:txBody>
+      </p:sp>
+      <p:sp>
+        <p:nvSpPr>
+          <p:cNvPr id="3" name="TextBox 2">
+            <a:extLst>
+              <a:ext uri="{FF2B5EF4-FFF2-40B4-BE49-F238E27FC236}">
+                <a16:creationId xmlns:a16="http://schemas.microsoft.com/office/drawing/2014/main" id="{87442074-2203-441B-B9C3-1789B543EB1B}"/>
+              </a:ext>
+            </a:extLst>
+          </p:cNvPr>
+          <p:cNvSpPr txBox="1"/>
+          <p:nvPr/>
+        </p:nvSpPr>
+        <p:spPr>
+          <a:xfrm>
+            <a:off x="122098" y="1937911"/>
+            <a:ext cx="6674648" cy="1754326"/>
+          </a:xfrm>
+          <a:prstGeom prst="rect">
+            <a:avLst/>
+          </a:prstGeom>
+          <a:noFill/>
+        </p:spPr>
+        <p:txBody>
+          <a:bodyPr wrap="none" rtlCol="0">
+            <a:spAutoFit/>
+          </a:bodyPr>
+          <a:lstStyle/>
+          <a:p>
+            <a:r>
+              <a:rPr lang="en-US" dirty="0" err="1"/>
+              <a:t>QLayoutItem</a:t>
+            </a:r>
+            <a:r>
+              <a:rPr lang="en-US" dirty="0"/>
+              <a:t>* item = </a:t>
+            </a:r>
+            <a:r>
+              <a:rPr lang="en-US" dirty="0" err="1"/>
+              <a:t>gridView</a:t>
+            </a:r>
+            <a:r>
+              <a:rPr lang="en-US" dirty="0"/>
+              <a:t>-&gt;</a:t>
+            </a:r>
+            <a:r>
+              <a:rPr lang="en-US" dirty="0" err="1"/>
+              <a:t>itemAtPosition</a:t>
+            </a:r>
+            <a:r>
+              <a:rPr lang="en-US" dirty="0"/>
+              <a:t>(row, column)</a:t>
+            </a:r>
+          </a:p>
+          <a:p>
+            <a:r>
+              <a:rPr lang="en-US" dirty="0"/>
+              <a:t>Wrapper* wrapper = item-&gt;widget();</a:t>
+            </a:r>
+          </a:p>
+          <a:p>
+            <a:r>
+              <a:rPr lang="en-US" dirty="0" err="1"/>
+              <a:t>QGridLayout</a:t>
+            </a:r>
+            <a:r>
+              <a:rPr lang="en-US" dirty="0"/>
+              <a:t>* </a:t>
+            </a:r>
+            <a:r>
+              <a:rPr lang="en-US" dirty="0" err="1"/>
+              <a:t>innerLayout</a:t>
+            </a:r>
+            <a:r>
+              <a:rPr lang="en-US" dirty="0"/>
+              <a:t> = wrapper-&gt;layout();</a:t>
+            </a:r>
+          </a:p>
+          <a:p>
+            <a:r>
+              <a:rPr lang="en-US" dirty="0" err="1"/>
+              <a:t>QLayoutItem</a:t>
+            </a:r>
+            <a:r>
+              <a:rPr lang="en-US" dirty="0"/>
+              <a:t>* </a:t>
+            </a:r>
+            <a:r>
+              <a:rPr lang="en-US" dirty="0" err="1"/>
+              <a:t>innerItem</a:t>
+            </a:r>
+            <a:r>
+              <a:rPr lang="en-US" dirty="0"/>
+              <a:t> = </a:t>
+            </a:r>
+            <a:r>
+              <a:rPr lang="en-US" dirty="0" err="1"/>
+              <a:t>innerLayout</a:t>
+            </a:r>
+            <a:r>
+              <a:rPr lang="en-US" dirty="0"/>
+              <a:t> &gt;</a:t>
+            </a:r>
+            <a:r>
+              <a:rPr lang="en-US" dirty="0" err="1"/>
+              <a:t>itemAtPosition</a:t>
+            </a:r>
+            <a:r>
+              <a:rPr lang="en-US" dirty="0"/>
+              <a:t>(row, column)</a:t>
+            </a:r>
+          </a:p>
+          <a:p>
+            <a:r>
+              <a:rPr lang="en-US" dirty="0"/>
+              <a:t>Holder* holder = </a:t>
+            </a:r>
+            <a:r>
+              <a:rPr lang="en-US" dirty="0" err="1"/>
+              <a:t>innerItem</a:t>
+            </a:r>
+            <a:r>
+              <a:rPr lang="en-US" dirty="0"/>
+              <a:t>-&gt;widget();</a:t>
+            </a:r>
+          </a:p>
+          <a:p>
+            <a:r>
+              <a:rPr lang="en-US" dirty="0" err="1"/>
+              <a:t>OSLineEdit</a:t>
+            </a:r>
+            <a:r>
+              <a:rPr lang="en-US" dirty="0"/>
+              <a:t>* </a:t>
+            </a:r>
+            <a:r>
+              <a:rPr lang="en-US" dirty="0" err="1"/>
+              <a:t>lineEdit</a:t>
+            </a:r>
+            <a:r>
+              <a:rPr lang="en-US" dirty="0"/>
+              <a:t> = holder-&gt;widget(); // or other </a:t>
+            </a:r>
+            <a:r>
+              <a:rPr lang="en-US" dirty="0" err="1"/>
+              <a:t>OSWidget</a:t>
+            </a:r>
+            <a:endParaRPr lang="en-US" dirty="0"/>
+          </a:p>
+        </p:txBody>
+      </p:sp>
+      <p:graphicFrame>
+        <p:nvGraphicFramePr>
+          <p:cNvPr id="6" name="Table 7">
+            <a:extLst>
+              <a:ext uri="{FF2B5EF4-FFF2-40B4-BE49-F238E27FC236}">
+                <a16:creationId xmlns:a16="http://schemas.microsoft.com/office/drawing/2014/main" id="{005622D3-3979-499E-8955-ED77DD639F4C}"/>
+              </a:ext>
+            </a:extLst>
+          </p:cNvPr>
+          <p:cNvGraphicFramePr>
+            <a:graphicFrameLocks noGrp="1"/>
+          </p:cNvGraphicFramePr>
+          <p:nvPr>
+            <p:extLst>
+              <p:ext uri="{D42A27DB-BD31-4B8C-83A1-F6EECF244321}">
+                <p14:modId xmlns:p14="http://schemas.microsoft.com/office/powerpoint/2010/main" val="714022712"/>
+              </p:ext>
+            </p:extLst>
+          </p:nvPr>
+        </p:nvGraphicFramePr>
+        <p:xfrm>
+          <a:off x="7005782" y="872839"/>
+          <a:ext cx="3468253" cy="4779818"/>
+        </p:xfrm>
+        <a:graphic>
+          <a:graphicData uri="http://schemas.openxmlformats.org/drawingml/2006/table">
+            <a:tbl>
+              <a:tblPr bandRow="1">
+                <a:tableStyleId>{5C22544A-7EE6-4342-B048-85BDC9FD1C3A}</a:tableStyleId>
+              </a:tblPr>
+              <a:tblGrid>
+                <a:gridCol w="3468253">
+                  <a:extLst>
+                    <a:ext uri="{9D8B030D-6E8A-4147-A177-3AD203B41FA5}">
+                      <a16:colId xmlns:a16="http://schemas.microsoft.com/office/drawing/2014/main" val="4213471232"/>
+                    </a:ext>
+                  </a:extLst>
+                </a:gridCol>
+              </a:tblGrid>
+              <a:tr h="1038278">
+                <a:tc>
+                  <a:txBody>
+                    <a:bodyPr/>
+                    <a:lstStyle/>
+                    <a:p>
+                      <a:endParaRPr lang="en-US" dirty="0"/>
+                    </a:p>
+                  </a:txBody>
+                  <a:tcPr/>
+                </a:tc>
+                <a:extLst>
+                  <a:ext uri="{0D108BD9-81ED-4DB2-BD59-A6C34878D82A}">
+                    <a16:rowId xmlns:a16="http://schemas.microsoft.com/office/drawing/2014/main" val="660588434"/>
+                  </a:ext>
+                </a:extLst>
+              </a:tr>
+              <a:tr h="935385">
+                <a:tc>
+                  <a:txBody>
+                    <a:bodyPr/>
+                    <a:lstStyle/>
+                    <a:p>
+                      <a:endParaRPr lang="en-US" dirty="0"/>
+                    </a:p>
+                  </a:txBody>
+                  <a:tcPr/>
+                </a:tc>
+                <a:extLst>
+                  <a:ext uri="{0D108BD9-81ED-4DB2-BD59-A6C34878D82A}">
+                    <a16:rowId xmlns:a16="http://schemas.microsoft.com/office/drawing/2014/main" val="1236790535"/>
+                  </a:ext>
+                </a:extLst>
+              </a:tr>
+              <a:tr h="935385">
+                <a:tc>
+                  <a:txBody>
+                    <a:bodyPr/>
+                    <a:lstStyle/>
+                    <a:p>
+                      <a:endParaRPr lang="en-US"/>
+                    </a:p>
+                  </a:txBody>
+                  <a:tcPr/>
+                </a:tc>
+                <a:extLst>
+                  <a:ext uri="{0D108BD9-81ED-4DB2-BD59-A6C34878D82A}">
+                    <a16:rowId xmlns:a16="http://schemas.microsoft.com/office/drawing/2014/main" val="2562153510"/>
+                  </a:ext>
+                </a:extLst>
+              </a:tr>
+              <a:tr h="935385">
+                <a:tc>
+                  <a:txBody>
+                    <a:bodyPr/>
+                    <a:lstStyle/>
+                    <a:p>
+                      <a:endParaRPr lang="en-US"/>
+                    </a:p>
+                  </a:txBody>
+                  <a:tcPr/>
+                </a:tc>
+                <a:extLst>
+                  <a:ext uri="{0D108BD9-81ED-4DB2-BD59-A6C34878D82A}">
+                    <a16:rowId xmlns:a16="http://schemas.microsoft.com/office/drawing/2014/main" val="3742985646"/>
+                  </a:ext>
+                </a:extLst>
+              </a:tr>
+              <a:tr h="935385">
+                <a:tc>
+                  <a:txBody>
+                    <a:bodyPr/>
+                    <a:lstStyle/>
+                    <a:p>
+                      <a:endParaRPr lang="en-US" dirty="0"/>
+                    </a:p>
+                  </a:txBody>
+                  <a:tcPr/>
+                </a:tc>
+                <a:extLst>
+                  <a:ext uri="{0D108BD9-81ED-4DB2-BD59-A6C34878D82A}">
+                    <a16:rowId xmlns:a16="http://schemas.microsoft.com/office/drawing/2014/main" val="3264146375"/>
+                  </a:ext>
+                </a:extLst>
+              </a:tr>
+            </a:tbl>
+          </a:graphicData>
+        </a:graphic>
+      </p:graphicFrame>
+      <p:sp>
+        <p:nvSpPr>
+          <p:cNvPr id="8" name="Rectangle: Rounded Corners 7">
+            <a:extLst>
+              <a:ext uri="{FF2B5EF4-FFF2-40B4-BE49-F238E27FC236}">
+                <a16:creationId xmlns:a16="http://schemas.microsoft.com/office/drawing/2014/main" id="{829D2BE5-9B5A-4F50-B726-2DA6DE304725}"/>
+              </a:ext>
+            </a:extLst>
+          </p:cNvPr>
+          <p:cNvSpPr/>
+          <p:nvPr/>
+        </p:nvSpPr>
+        <p:spPr>
+          <a:xfrm>
+            <a:off x="7730837" y="1342419"/>
+            <a:ext cx="1925782" cy="374073"/>
+          </a:xfrm>
+          <a:prstGeom prst="roundRect">
+            <a:avLst/>
+          </a:prstGeom>
+        </p:spPr>
+        <p:style>
+          <a:lnRef idx="2">
+            <a:schemeClr val="accent1">
+              <a:shade val="50000"/>
+            </a:schemeClr>
+          </a:lnRef>
+          <a:fillRef idx="1">
+            <a:schemeClr val="accent1"/>
+          </a:fillRef>
+          <a:effectRef idx="0">
+            <a:schemeClr val="accent1"/>
+          </a:effectRef>
+          <a:fontRef idx="minor">
+            <a:schemeClr val="lt1"/>
+          </a:fontRef>
+        </p:style>
+        <p:txBody>
+          <a:bodyPr rtlCol="0" anchor="ctr"/>
+          <a:lstStyle/>
+          <a:p>
+            <a:pPr algn="ctr"/>
+            <a:r>
+              <a:rPr lang="en-US" dirty="0" err="1"/>
+              <a:t>OSWidget</a:t>
+            </a:r>
+            <a:endParaRPr lang="en-US" dirty="0"/>
+          </a:p>
+        </p:txBody>
+      </p:sp>
+      <p:sp>
+        <p:nvSpPr>
+          <p:cNvPr id="28" name="Rectangle: Rounded Corners 27">
+            <a:extLst>
+              <a:ext uri="{FF2B5EF4-FFF2-40B4-BE49-F238E27FC236}">
+                <a16:creationId xmlns:a16="http://schemas.microsoft.com/office/drawing/2014/main" id="{90217BCD-91AF-4415-AFDC-5B93B9A0EA70}"/>
+              </a:ext>
+            </a:extLst>
+          </p:cNvPr>
+          <p:cNvSpPr/>
+          <p:nvPr/>
+        </p:nvSpPr>
+        <p:spPr>
+          <a:xfrm>
+            <a:off x="7730837" y="2271501"/>
+            <a:ext cx="1925782" cy="374073"/>
+          </a:xfrm>
+          <a:prstGeom prst="roundRect">
+            <a:avLst/>
+          </a:prstGeom>
+        </p:spPr>
+        <p:style>
+          <a:lnRef idx="2">
+            <a:schemeClr val="accent1">
+              <a:shade val="50000"/>
+            </a:schemeClr>
+          </a:lnRef>
+          <a:fillRef idx="1">
+            <a:schemeClr val="accent1"/>
+          </a:fillRef>
+          <a:effectRef idx="0">
+            <a:schemeClr val="accent1"/>
+          </a:effectRef>
+          <a:fontRef idx="minor">
+            <a:schemeClr val="lt1"/>
+          </a:fontRef>
+        </p:style>
+        <p:txBody>
+          <a:bodyPr rtlCol="0" anchor="ctr"/>
+          <a:lstStyle/>
+          <a:p>
+            <a:pPr algn="ctr"/>
+            <a:r>
+              <a:rPr lang="en-US" dirty="0" err="1"/>
+              <a:t>OSWidget</a:t>
+            </a:r>
+            <a:endParaRPr lang="en-US" dirty="0"/>
+          </a:p>
+        </p:txBody>
+      </p:sp>
+      <p:sp>
+        <p:nvSpPr>
+          <p:cNvPr id="30" name="Rectangle: Rounded Corners 29">
+            <a:extLst>
+              <a:ext uri="{FF2B5EF4-FFF2-40B4-BE49-F238E27FC236}">
+                <a16:creationId xmlns:a16="http://schemas.microsoft.com/office/drawing/2014/main" id="{D65D8673-B65A-4E11-862A-D5E3BBF925DE}"/>
+              </a:ext>
+            </a:extLst>
+          </p:cNvPr>
+          <p:cNvSpPr/>
+          <p:nvPr/>
+        </p:nvSpPr>
+        <p:spPr>
+          <a:xfrm>
+            <a:off x="7730837" y="3182902"/>
+            <a:ext cx="1925782" cy="374073"/>
+          </a:xfrm>
+          <a:prstGeom prst="roundRect">
+            <a:avLst/>
+          </a:prstGeom>
+        </p:spPr>
+        <p:style>
+          <a:lnRef idx="2">
+            <a:schemeClr val="accent1">
+              <a:shade val="50000"/>
+            </a:schemeClr>
+          </a:lnRef>
+          <a:fillRef idx="1">
+            <a:schemeClr val="accent1"/>
+          </a:fillRef>
+          <a:effectRef idx="0">
+            <a:schemeClr val="accent1"/>
+          </a:effectRef>
+          <a:fontRef idx="minor">
+            <a:schemeClr val="lt1"/>
+          </a:fontRef>
+        </p:style>
+        <p:txBody>
+          <a:bodyPr rtlCol="0" anchor="ctr"/>
+          <a:lstStyle/>
+          <a:p>
+            <a:pPr algn="ctr"/>
+            <a:r>
+              <a:rPr lang="en-US" dirty="0" err="1"/>
+              <a:t>OSWidget</a:t>
+            </a:r>
+            <a:endParaRPr lang="en-US" dirty="0"/>
+          </a:p>
+        </p:txBody>
+      </p:sp>
+      <p:sp>
+        <p:nvSpPr>
+          <p:cNvPr id="31" name="Rectangle: Rounded Corners 30">
+            <a:extLst>
+              <a:ext uri="{FF2B5EF4-FFF2-40B4-BE49-F238E27FC236}">
+                <a16:creationId xmlns:a16="http://schemas.microsoft.com/office/drawing/2014/main" id="{3E56BFDB-313D-4559-8FD8-E5E882C9D34A}"/>
+              </a:ext>
+            </a:extLst>
+          </p:cNvPr>
+          <p:cNvSpPr/>
+          <p:nvPr/>
+        </p:nvSpPr>
+        <p:spPr>
+          <a:xfrm>
+            <a:off x="7730837" y="4120262"/>
+            <a:ext cx="1925782" cy="374073"/>
+          </a:xfrm>
+          <a:prstGeom prst="roundRect">
+            <a:avLst/>
+          </a:prstGeom>
+        </p:spPr>
+        <p:style>
+          <a:lnRef idx="2">
+            <a:schemeClr val="accent1">
+              <a:shade val="50000"/>
+            </a:schemeClr>
+          </a:lnRef>
+          <a:fillRef idx="1">
+            <a:schemeClr val="accent1"/>
+          </a:fillRef>
+          <a:effectRef idx="0">
+            <a:schemeClr val="accent1"/>
+          </a:effectRef>
+          <a:fontRef idx="minor">
+            <a:schemeClr val="lt1"/>
+          </a:fontRef>
+        </p:style>
+        <p:txBody>
+          <a:bodyPr rtlCol="0" anchor="ctr"/>
+          <a:lstStyle/>
+          <a:p>
+            <a:pPr algn="ctr"/>
+            <a:r>
+              <a:rPr lang="en-US" dirty="0" err="1"/>
+              <a:t>OSWidget</a:t>
+            </a:r>
+            <a:endParaRPr lang="en-US" dirty="0"/>
+          </a:p>
+        </p:txBody>
+      </p:sp>
+      <p:sp>
+        <p:nvSpPr>
+          <p:cNvPr id="33" name="Rectangle: Rounded Corners 32">
+            <a:extLst>
+              <a:ext uri="{FF2B5EF4-FFF2-40B4-BE49-F238E27FC236}">
+                <a16:creationId xmlns:a16="http://schemas.microsoft.com/office/drawing/2014/main" id="{E084AF3B-6268-4EC4-A9BB-10ABA96F77FB}"/>
+              </a:ext>
+            </a:extLst>
+          </p:cNvPr>
+          <p:cNvSpPr/>
+          <p:nvPr/>
+        </p:nvSpPr>
+        <p:spPr>
+          <a:xfrm>
+            <a:off x="7730837" y="5059697"/>
+            <a:ext cx="1925782" cy="374073"/>
+          </a:xfrm>
+          <a:prstGeom prst="roundRect">
+            <a:avLst/>
+          </a:prstGeom>
+        </p:spPr>
+        <p:style>
+          <a:lnRef idx="2">
+            <a:schemeClr val="accent1">
+              <a:shade val="50000"/>
+            </a:schemeClr>
+          </a:lnRef>
+          <a:fillRef idx="1">
+            <a:schemeClr val="accent1"/>
+          </a:fillRef>
+          <a:effectRef idx="0">
+            <a:schemeClr val="accent1"/>
+          </a:effectRef>
+          <a:fontRef idx="minor">
+            <a:schemeClr val="lt1"/>
+          </a:fontRef>
+        </p:style>
+        <p:txBody>
+          <a:bodyPr rtlCol="0" anchor="ctr"/>
+          <a:lstStyle/>
+          <a:p>
+            <a:pPr algn="ctr"/>
+            <a:r>
+              <a:rPr lang="en-US" dirty="0" err="1"/>
+              <a:t>OSWidget</a:t>
+            </a:r>
+            <a:endParaRPr lang="en-US" dirty="0"/>
+          </a:p>
+        </p:txBody>
+      </p:sp>
+      <p:sp>
+        <p:nvSpPr>
+          <p:cNvPr id="9" name="TextBox 8">
+            <a:extLst>
+              <a:ext uri="{FF2B5EF4-FFF2-40B4-BE49-F238E27FC236}">
+                <a16:creationId xmlns:a16="http://schemas.microsoft.com/office/drawing/2014/main" id="{D109531E-266A-4BE2-8442-91E2234E9B51}"/>
+              </a:ext>
+            </a:extLst>
+          </p:cNvPr>
+          <p:cNvSpPr txBox="1"/>
+          <p:nvPr/>
+        </p:nvSpPr>
+        <p:spPr>
+          <a:xfrm>
+            <a:off x="6722484" y="399596"/>
+            <a:ext cx="1008353" cy="369332"/>
+          </a:xfrm>
+          <a:prstGeom prst="rect">
+            <a:avLst/>
+          </a:prstGeom>
+          <a:noFill/>
+        </p:spPr>
+        <p:txBody>
+          <a:bodyPr wrap="none" rtlCol="0">
+            <a:spAutoFit/>
+          </a:bodyPr>
+          <a:lstStyle/>
+          <a:p>
+            <a:r>
+              <a:rPr lang="en-US" dirty="0"/>
+              <a:t>Wrapper</a:t>
+            </a:r>
+          </a:p>
+        </p:txBody>
+      </p:sp>
+      <p:sp>
+        <p:nvSpPr>
+          <p:cNvPr id="34" name="TextBox 33">
+            <a:extLst>
+              <a:ext uri="{FF2B5EF4-FFF2-40B4-BE49-F238E27FC236}">
+                <a16:creationId xmlns:a16="http://schemas.microsoft.com/office/drawing/2014/main" id="{9CB52A97-E6CE-4C50-AEC8-F2BC0552D9AD}"/>
+              </a:ext>
+            </a:extLst>
+          </p:cNvPr>
+          <p:cNvSpPr txBox="1"/>
+          <p:nvPr/>
+        </p:nvSpPr>
+        <p:spPr>
+          <a:xfrm>
+            <a:off x="7005782" y="872839"/>
+            <a:ext cx="821059" cy="369332"/>
+          </a:xfrm>
+          <a:prstGeom prst="rect">
+            <a:avLst/>
+          </a:prstGeom>
+          <a:noFill/>
+        </p:spPr>
+        <p:txBody>
+          <a:bodyPr wrap="none" rtlCol="0">
+            <a:spAutoFit/>
+          </a:bodyPr>
+          <a:lstStyle/>
+          <a:p>
+            <a:r>
+              <a:rPr lang="en-US" dirty="0"/>
+              <a:t>Holder</a:t>
+            </a:r>
+          </a:p>
+        </p:txBody>
+      </p:sp>
+      <p:sp>
+        <p:nvSpPr>
+          <p:cNvPr id="35" name="TextBox 34">
+            <a:extLst>
+              <a:ext uri="{FF2B5EF4-FFF2-40B4-BE49-F238E27FC236}">
+                <a16:creationId xmlns:a16="http://schemas.microsoft.com/office/drawing/2014/main" id="{E5BD9DAC-5A9B-4904-880C-5228566E887A}"/>
+              </a:ext>
+            </a:extLst>
+          </p:cNvPr>
+          <p:cNvSpPr txBox="1"/>
+          <p:nvPr/>
+        </p:nvSpPr>
+        <p:spPr>
+          <a:xfrm>
+            <a:off x="6968346" y="1918844"/>
+            <a:ext cx="821059" cy="369332"/>
+          </a:xfrm>
+          <a:prstGeom prst="rect">
+            <a:avLst/>
+          </a:prstGeom>
+          <a:noFill/>
+        </p:spPr>
+        <p:txBody>
+          <a:bodyPr wrap="none" rtlCol="0">
+            <a:spAutoFit/>
+          </a:bodyPr>
+          <a:lstStyle/>
+          <a:p>
+            <a:r>
+              <a:rPr lang="en-US" dirty="0"/>
+              <a:t>Holder</a:t>
+            </a:r>
+          </a:p>
+        </p:txBody>
+      </p:sp>
+      <p:sp>
+        <p:nvSpPr>
+          <p:cNvPr id="36" name="TextBox 35">
+            <a:extLst>
+              <a:ext uri="{FF2B5EF4-FFF2-40B4-BE49-F238E27FC236}">
+                <a16:creationId xmlns:a16="http://schemas.microsoft.com/office/drawing/2014/main" id="{32A56CE0-AA1D-4126-9A60-849BE385C63B}"/>
+              </a:ext>
+            </a:extLst>
+          </p:cNvPr>
+          <p:cNvSpPr txBox="1"/>
+          <p:nvPr/>
+        </p:nvSpPr>
+        <p:spPr>
+          <a:xfrm>
+            <a:off x="6968346" y="2849289"/>
+            <a:ext cx="821059" cy="369332"/>
+          </a:xfrm>
+          <a:prstGeom prst="rect">
+            <a:avLst/>
+          </a:prstGeom>
+          <a:noFill/>
+        </p:spPr>
+        <p:txBody>
+          <a:bodyPr wrap="none" rtlCol="0">
+            <a:spAutoFit/>
+          </a:bodyPr>
+          <a:lstStyle/>
+          <a:p>
+            <a:r>
+              <a:rPr lang="en-US" dirty="0"/>
+              <a:t>Holder</a:t>
+            </a:r>
+          </a:p>
+        </p:txBody>
+      </p:sp>
+      <p:sp>
+        <p:nvSpPr>
+          <p:cNvPr id="38" name="TextBox 37">
+            <a:extLst>
+              <a:ext uri="{FF2B5EF4-FFF2-40B4-BE49-F238E27FC236}">
+                <a16:creationId xmlns:a16="http://schemas.microsoft.com/office/drawing/2014/main" id="{A31A84D0-CEEB-44F8-9576-225AEE4F609A}"/>
+              </a:ext>
+            </a:extLst>
+          </p:cNvPr>
+          <p:cNvSpPr txBox="1"/>
+          <p:nvPr/>
+        </p:nvSpPr>
+        <p:spPr>
+          <a:xfrm>
+            <a:off x="6968346" y="3782106"/>
+            <a:ext cx="821059" cy="369332"/>
+          </a:xfrm>
+          <a:prstGeom prst="rect">
+            <a:avLst/>
+          </a:prstGeom>
+          <a:noFill/>
+        </p:spPr>
+        <p:txBody>
+          <a:bodyPr wrap="none" rtlCol="0">
+            <a:spAutoFit/>
+          </a:bodyPr>
+          <a:lstStyle/>
+          <a:p>
+            <a:r>
+              <a:rPr lang="en-US" dirty="0"/>
+              <a:t>Holder</a:t>
+            </a:r>
+          </a:p>
+        </p:txBody>
+      </p:sp>
+      <p:sp>
+        <p:nvSpPr>
+          <p:cNvPr id="39" name="TextBox 38">
+            <a:extLst>
+              <a:ext uri="{FF2B5EF4-FFF2-40B4-BE49-F238E27FC236}">
+                <a16:creationId xmlns:a16="http://schemas.microsoft.com/office/drawing/2014/main" id="{4860F9A1-3E02-4BD1-B56B-D27736444A89}"/>
+              </a:ext>
+            </a:extLst>
+          </p:cNvPr>
+          <p:cNvSpPr txBox="1"/>
+          <p:nvPr/>
+        </p:nvSpPr>
+        <p:spPr>
+          <a:xfrm>
+            <a:off x="7005782" y="4746474"/>
+            <a:ext cx="821059" cy="369332"/>
+          </a:xfrm>
+          <a:prstGeom prst="rect">
+            <a:avLst/>
+          </a:prstGeom>
+          <a:noFill/>
+        </p:spPr>
+        <p:txBody>
+          <a:bodyPr wrap="none" rtlCol="0">
+            <a:spAutoFit/>
+          </a:bodyPr>
+          <a:lstStyle/>
+          <a:p>
+            <a:r>
+              <a:rPr lang="en-US" dirty="0"/>
+              <a:t>Holder</a:t>
+            </a:r>
+          </a:p>
+        </p:txBody>
+      </p:sp>
+    </p:spTree>
+    <p:extLst>
+      <p:ext uri="{BB962C8B-B14F-4D97-AF65-F5344CB8AC3E}">
+        <p14:creationId xmlns:p14="http://schemas.microsoft.com/office/powerpoint/2010/main" val="2411312338"/>
+      </p:ext>
+    </p:extLst>
+  </p:cSld>
+  <p:clrMapOvr>
+    <a:masterClrMapping/>
+  </p:clrMapOvr>
+</p:sld>
+</file>
+
+<file path=ppt/slides/slide3.xml><?xml version="1.0" encoding="utf-8"?>
+<p:sld xmlns:a="http://schemas.openxmlformats.org/drawingml/2006/main" xmlns:r="http://schemas.openxmlformats.org/officeDocument/2006/relationships" xmlns:p="http://schemas.openxmlformats.org/presentationml/2006/main">
+  <p:cSld>
+    <p:spTree>
+      <p:nvGrpSpPr>
+        <p:cNvPr id="1" name=""/>
+        <p:cNvGrpSpPr/>
+        <p:nvPr/>
+      </p:nvGrpSpPr>
+      <p:grpSpPr>
+        <a:xfrm>
+          <a:off x="0" y="0"/>
+          <a:ext cx="0" cy="0"/>
+          <a:chOff x="0" y="0"/>
+          <a:chExt cx="0" cy="0"/>
+        </a:xfrm>
+      </p:grpSpPr>
+      <p:sp>
+        <p:nvSpPr>
           <p:cNvPr id="4" name="Rectangle 3">
             <a:extLst>
               <a:ext uri="{FF2B5EF4-FFF2-40B4-BE49-F238E27FC236}">
@@ -3635,13 +4453,7 @@
           <p:cNvGraphicFramePr>
             <a:graphicFrameLocks noGrp="1"/>
           </p:cNvGraphicFramePr>
-          <p:nvPr>
-            <p:extLst>
-              <p:ext uri="{D42A27DB-BD31-4B8C-83A1-F6EECF244321}">
-                <p14:modId xmlns:p14="http://schemas.microsoft.com/office/powerpoint/2010/main" val="2619649533"/>
-              </p:ext>
-            </p:extLst>
-          </p:nvPr>
+          <p:nvPr/>
         </p:nvGraphicFramePr>
         <p:xfrm>
           <a:off x="5353233" y="1304623"/>
@@ -3891,13 +4703,7 @@
           <p:cNvGraphicFramePr>
             <a:graphicFrameLocks noGrp="1"/>
           </p:cNvGraphicFramePr>
-          <p:nvPr>
-            <p:extLst>
-              <p:ext uri="{D42A27DB-BD31-4B8C-83A1-F6EECF244321}">
-                <p14:modId xmlns:p14="http://schemas.microsoft.com/office/powerpoint/2010/main" val="3549389139"/>
-              </p:ext>
-            </p:extLst>
-          </p:nvPr>
+          <p:nvPr/>
         </p:nvGraphicFramePr>
         <p:xfrm>
           <a:off x="5353234" y="254240"/>
@@ -4332,13 +5138,7 @@
           <p:cNvGraphicFramePr>
             <a:graphicFrameLocks noGrp="1"/>
           </p:cNvGraphicFramePr>
-          <p:nvPr>
-            <p:extLst>
-              <p:ext uri="{D42A27DB-BD31-4B8C-83A1-F6EECF244321}">
-                <p14:modId xmlns:p14="http://schemas.microsoft.com/office/powerpoint/2010/main" val="2638048771"/>
-              </p:ext>
-            </p:extLst>
-          </p:nvPr>
+          <p:nvPr/>
         </p:nvGraphicFramePr>
         <p:xfrm>
           <a:off x="9162495" y="3764061"/>
@@ -4754,8 +5554,8 @@
           </a:prstGeom>
           <a:ln>
             <a:prstDash val="dash"/>
-            <a:headEnd type="triangle" w="med" len="med"/>
-            <a:tailEnd type="triangle" w="med" len="med"/>
+            <a:headEnd type="arrow" w="med" len="med"/>
+            <a:tailEnd type="none" w="med" len="med"/>
           </a:ln>
         </p:spPr>
         <p:style>
@@ -4788,7 +5588,7 @@
         <p:spPr>
           <a:xfrm>
             <a:off x="5172825" y="3757868"/>
-            <a:ext cx="1281120" cy="369332"/>
+            <a:ext cx="1936812" cy="369332"/>
           </a:xfrm>
           <a:prstGeom prst="rect">
             <a:avLst/>
@@ -4802,8 +5602,12 @@
           <a:lstStyle/>
           <a:p>
             <a:r>
+              <a:rPr lang="en-US" dirty="0" err="1"/>
+              <a:t>inFocus</a:t>
+            </a:r>
+            <a:r>
               <a:rPr lang="en-US" dirty="0"/>
-              <a:t>Signals only</a:t>
+              <a:t> signal only</a:t>
             </a:r>
           </a:p>
         </p:txBody>
@@ -4811,7 +5615,7 @@
     </p:spTree>
     <p:extLst>
       <p:ext uri="{BB962C8B-B14F-4D97-AF65-F5344CB8AC3E}">
-        <p14:creationId xmlns:p14="http://schemas.microsoft.com/office/powerpoint/2010/main" val="2411312338"/>
+        <p14:creationId xmlns:p14="http://schemas.microsoft.com/office/powerpoint/2010/main" val="1746608700"/>
       </p:ext>
     </p:extLst>
   </p:cSld>
@@ -4821,7 +5625,7 @@
 </p:sld>
 </file>
 
-<file path=ppt/slides/slide3.xml><?xml version="1.0" encoding="utf-8"?>
+<file path=ppt/slides/slide4.xml><?xml version="1.0" encoding="utf-8"?>
 <p:sld xmlns:a="http://schemas.openxmlformats.org/drawingml/2006/main" xmlns:r="http://schemas.openxmlformats.org/officeDocument/2006/relationships" xmlns:p="http://schemas.openxmlformats.org/presentationml/2006/main">
   <p:cSld>
     <p:spTree>
@@ -6862,7 +7666,7 @@
 </p:sld>
 </file>
 
-<file path=ppt/slides/slide4.xml><?xml version="1.0" encoding="utf-8"?>
+<file path=ppt/slides/slide5.xml><?xml version="1.0" encoding="utf-8"?>
 <p:sld xmlns:a="http://schemas.openxmlformats.org/drawingml/2006/main" xmlns:r="http://schemas.openxmlformats.org/officeDocument/2006/relationships" xmlns:p="http://schemas.openxmlformats.org/presentationml/2006/main">
   <p:cSld>
     <p:spTree>
@@ -8035,7 +8839,7 @@
 </p:sld>
 </file>
 
-<file path=ppt/slides/slide5.xml><?xml version="1.0" encoding="utf-8"?>
+<file path=ppt/slides/slide6.xml><?xml version="1.0" encoding="utf-8"?>
 <p:sld xmlns:a="http://schemas.openxmlformats.org/drawingml/2006/main" xmlns:r="http://schemas.openxmlformats.org/officeDocument/2006/relationships" xmlns:p="http://schemas.openxmlformats.org/presentationml/2006/main">
   <p:cSld>
     <p:spTree>
@@ -9433,7 +10237,7 @@
 </p:sld>
 </file>
 
-<file path=ppt/slides/slide6.xml><?xml version="1.0" encoding="utf-8"?>
+<file path=ppt/slides/slide7.xml><?xml version="1.0" encoding="utf-8"?>
 <p:sld xmlns:a="http://schemas.openxmlformats.org/drawingml/2006/main" xmlns:r="http://schemas.openxmlformats.org/officeDocument/2006/relationships" xmlns:p="http://schemas.openxmlformats.org/presentationml/2006/main">
   <p:cSld>
     <p:spTree>
@@ -11162,7 +11966,7 @@
 </p:sld>
 </file>
 
-<file path=ppt/slides/slide7.xml><?xml version="1.0" encoding="utf-8"?>
+<file path=ppt/slides/slide8.xml><?xml version="1.0" encoding="utf-8"?>
 <p:sld xmlns:a="http://schemas.openxmlformats.org/drawingml/2006/main" xmlns:r="http://schemas.openxmlformats.org/officeDocument/2006/relationships" xmlns:p="http://schemas.openxmlformats.org/presentationml/2006/main">
   <p:cSld>
     <p:spTree>

</xml_diff>

<commit_message>
Done for the day
</commit_message>
<xml_diff>
--- a/developer/doc/Design/OSAppDesign.pptx
+++ b/developer/doc/Design/OSAppDesign.pptx
@@ -4635,62 +4635,6 @@
           </a:graphicData>
         </a:graphic>
       </p:graphicFrame>
-      <p:sp>
-        <p:nvSpPr>
-          <p:cNvPr id="16" name="Rectangle 15">
-            <a:extLst>
-              <a:ext uri="{FF2B5EF4-FFF2-40B4-BE49-F238E27FC236}">
-                <a16:creationId xmlns:a16="http://schemas.microsoft.com/office/drawing/2014/main" id="{7D110FAB-0B17-4153-A7DA-020D61FE816B}"/>
-              </a:ext>
-            </a:extLst>
-          </p:cNvPr>
-          <p:cNvSpPr/>
-          <p:nvPr/>
-        </p:nvSpPr>
-        <p:spPr>
-          <a:xfrm>
-            <a:off x="6616452" y="2463921"/>
-            <a:ext cx="980243" cy="802485"/>
-          </a:xfrm>
-          <a:prstGeom prst="rect">
-            <a:avLst/>
-          </a:prstGeom>
-        </p:spPr>
-        <p:style>
-          <a:lnRef idx="2">
-            <a:schemeClr val="accent1">
-              <a:shade val="50000"/>
-            </a:schemeClr>
-          </a:lnRef>
-          <a:fillRef idx="1">
-            <a:schemeClr val="accent1"/>
-          </a:fillRef>
-          <a:effectRef idx="0">
-            <a:schemeClr val="accent1"/>
-          </a:effectRef>
-          <a:fontRef idx="minor">
-            <a:schemeClr val="lt1"/>
-          </a:fontRef>
-        </p:style>
-        <p:txBody>
-          <a:bodyPr rtlCol="0" anchor="ctr"/>
-          <a:lstStyle/>
-          <a:p>
-            <a:pPr algn="ctr"/>
-            <a:r>
-              <a:rPr lang="en-US" dirty="0"/>
-              <a:t>Holder</a:t>
-            </a:r>
-            <a:br>
-              <a:rPr lang="en-US" sz="1400" dirty="0"/>
-            </a:br>
-            <a:r>
-              <a:rPr lang="en-US" sz="1400" dirty="0"/>
-              <a:t>widget</a:t>
-            </a:r>
-          </a:p>
-        </p:txBody>
-      </p:sp>
       <p:graphicFrame>
         <p:nvGraphicFramePr>
           <p:cNvPr id="24" name="Table 23">
@@ -5539,15 +5483,16 @@
             </a:extLst>
           </p:cNvPr>
           <p:cNvCxnSpPr>
+            <a:cxnSpLocks/>
             <a:stCxn id="17" idx="3"/>
-            <a:endCxn id="10" idx="2"/>
+            <a:endCxn id="16" idx="2"/>
           </p:cNvCxnSpPr>
           <p:nvPr/>
         </p:nvCxnSpPr>
         <p:spPr>
           <a:xfrm flipV="1">
-            <a:off x="4072256" y="3283550"/>
-            <a:ext cx="3034317" cy="616415"/>
+            <a:off x="4072256" y="3233085"/>
+            <a:ext cx="3034316" cy="666880"/>
           </a:xfrm>
           <a:prstGeom prst="straightConnector1">
             <a:avLst/>
@@ -5608,6 +5553,114 @@
             <a:r>
               <a:rPr lang="en-US" dirty="0"/>
               <a:t> signal only</a:t>
+            </a:r>
+          </a:p>
+        </p:txBody>
+      </p:sp>
+      <p:sp>
+        <p:nvSpPr>
+          <p:cNvPr id="2" name="Rectangle 1">
+            <a:extLst>
+              <a:ext uri="{FF2B5EF4-FFF2-40B4-BE49-F238E27FC236}">
+                <a16:creationId xmlns:a16="http://schemas.microsoft.com/office/drawing/2014/main" id="{9B3F2D70-CE20-448E-9C35-D17523AEA747}"/>
+              </a:ext>
+            </a:extLst>
+          </p:cNvPr>
+          <p:cNvSpPr/>
+          <p:nvPr/>
+        </p:nvSpPr>
+        <p:spPr>
+          <a:xfrm>
+            <a:off x="6529524" y="2379155"/>
+            <a:ext cx="1154097" cy="887251"/>
+          </a:xfrm>
+          <a:prstGeom prst="rect">
+            <a:avLst/>
+          </a:prstGeom>
+        </p:spPr>
+        <p:style>
+          <a:lnRef idx="2">
+            <a:schemeClr val="accent1">
+              <a:shade val="50000"/>
+            </a:schemeClr>
+          </a:lnRef>
+          <a:fillRef idx="1">
+            <a:schemeClr val="accent1"/>
+          </a:fillRef>
+          <a:effectRef idx="0">
+            <a:schemeClr val="accent1"/>
+          </a:effectRef>
+          <a:fontRef idx="minor">
+            <a:schemeClr val="lt1"/>
+          </a:fontRef>
+        </p:style>
+        <p:txBody>
+          <a:bodyPr rtlCol="0" anchor="t"/>
+          <a:lstStyle/>
+          <a:p>
+            <a:pPr algn="ctr"/>
+            <a:r>
+              <a:rPr lang="en-US" dirty="0"/>
+              <a:t>Wrapper</a:t>
+            </a:r>
+          </a:p>
+        </p:txBody>
+      </p:sp>
+      <p:sp>
+        <p:nvSpPr>
+          <p:cNvPr id="16" name="Rectangle 15">
+            <a:extLst>
+              <a:ext uri="{FF2B5EF4-FFF2-40B4-BE49-F238E27FC236}">
+                <a16:creationId xmlns:a16="http://schemas.microsoft.com/office/drawing/2014/main" id="{7D110FAB-0B17-4153-A7DA-020D61FE816B}"/>
+              </a:ext>
+            </a:extLst>
+          </p:cNvPr>
+          <p:cNvSpPr/>
+          <p:nvPr/>
+        </p:nvSpPr>
+        <p:spPr>
+          <a:xfrm>
+            <a:off x="6616450" y="2692124"/>
+            <a:ext cx="980243" cy="540961"/>
+          </a:xfrm>
+          <a:prstGeom prst="rect">
+            <a:avLst/>
+          </a:prstGeom>
+          <a:solidFill>
+            <a:schemeClr val="accent6"/>
+          </a:solidFill>
+        </p:spPr>
+        <p:style>
+          <a:lnRef idx="2">
+            <a:schemeClr val="accent1">
+              <a:shade val="50000"/>
+            </a:schemeClr>
+          </a:lnRef>
+          <a:fillRef idx="1">
+            <a:schemeClr val="accent1"/>
+          </a:fillRef>
+          <a:effectRef idx="0">
+            <a:schemeClr val="accent1"/>
+          </a:effectRef>
+          <a:fontRef idx="minor">
+            <a:schemeClr val="lt1"/>
+          </a:fontRef>
+        </p:style>
+        <p:txBody>
+          <a:bodyPr rtlCol="0" anchor="ctr"/>
+          <a:lstStyle/>
+          <a:p>
+            <a:pPr algn="ctr"/>
+            <a:r>
+              <a:rPr lang="en-US" dirty="0"/>
+              <a:t>Holder</a:t>
+            </a:r>
+            <a:br>
+              <a:rPr lang="en-US" sz="1400" dirty="0"/>
+            </a:br>
+            <a:r>
+              <a:rPr lang="en-US" sz="1400" dirty="0"/>
+              <a:t>widget</a:t>
             </a:r>
           </a:p>
         </p:txBody>

</xml_diff>